<commit_message>
diagram update inc. artefact
</commit_message>
<xml_diff>
--- a/profilesont/diagrams.pptx
+++ b/profilesont/diagrams.pptx
@@ -266,7 +266,7 @@
           <a:lstStyle/>
           <a:p>
             <a:fld id="{7E83BB5F-FC7B-E342-A7CB-8A5E9A913100}" type="datetimeFigureOut">
-              <a:t>9/13/2018</a:t>
+              <a:t>10/11/2018</a:t>
             </a:fld>
             <a:endParaRPr lang="en-US"/>
           </a:p>
@@ -462,7 +462,7 @@
           <a:lstStyle/>
           <a:p>
             <a:fld id="{7E83BB5F-FC7B-E342-A7CB-8A5E9A913100}" type="datetimeFigureOut">
-              <a:t>9/13/2018</a:t>
+              <a:t>10/11/2018</a:t>
             </a:fld>
             <a:endParaRPr lang="en-US"/>
           </a:p>
@@ -668,7 +668,7 @@
           <a:lstStyle/>
           <a:p>
             <a:fld id="{7E83BB5F-FC7B-E342-A7CB-8A5E9A913100}" type="datetimeFigureOut">
-              <a:t>9/13/2018</a:t>
+              <a:t>10/11/2018</a:t>
             </a:fld>
             <a:endParaRPr lang="en-US"/>
           </a:p>
@@ -864,7 +864,7 @@
           <a:lstStyle/>
           <a:p>
             <a:fld id="{7E83BB5F-FC7B-E342-A7CB-8A5E9A913100}" type="datetimeFigureOut">
-              <a:t>9/13/2018</a:t>
+              <a:t>10/11/2018</a:t>
             </a:fld>
             <a:endParaRPr lang="en-US"/>
           </a:p>
@@ -1137,7 +1137,7 @@
           <a:lstStyle/>
           <a:p>
             <a:fld id="{7E83BB5F-FC7B-E342-A7CB-8A5E9A913100}" type="datetimeFigureOut">
-              <a:t>9/13/2018</a:t>
+              <a:t>10/11/2018</a:t>
             </a:fld>
             <a:endParaRPr lang="en-US"/>
           </a:p>
@@ -1400,7 +1400,7 @@
           <a:lstStyle/>
           <a:p>
             <a:fld id="{7E83BB5F-FC7B-E342-A7CB-8A5E9A913100}" type="datetimeFigureOut">
-              <a:t>9/13/2018</a:t>
+              <a:t>10/11/2018</a:t>
             </a:fld>
             <a:endParaRPr lang="en-US"/>
           </a:p>
@@ -1810,7 +1810,7 @@
           <a:lstStyle/>
           <a:p>
             <a:fld id="{7E83BB5F-FC7B-E342-A7CB-8A5E9A913100}" type="datetimeFigureOut">
-              <a:t>9/13/2018</a:t>
+              <a:t>10/11/2018</a:t>
             </a:fld>
             <a:endParaRPr lang="en-US"/>
           </a:p>
@@ -1949,7 +1949,7 @@
           <a:lstStyle/>
           <a:p>
             <a:fld id="{7E83BB5F-FC7B-E342-A7CB-8A5E9A913100}" type="datetimeFigureOut">
-              <a:t>9/13/2018</a:t>
+              <a:t>10/11/2018</a:t>
             </a:fld>
             <a:endParaRPr lang="en-US"/>
           </a:p>
@@ -2060,7 +2060,7 @@
           <a:lstStyle/>
           <a:p>
             <a:fld id="{7E83BB5F-FC7B-E342-A7CB-8A5E9A913100}" type="datetimeFigureOut">
-              <a:t>9/13/2018</a:t>
+              <a:t>10/11/2018</a:t>
             </a:fld>
             <a:endParaRPr lang="en-US"/>
           </a:p>
@@ -2369,7 +2369,7 @@
           <a:lstStyle/>
           <a:p>
             <a:fld id="{7E83BB5F-FC7B-E342-A7CB-8A5E9A913100}" type="datetimeFigureOut">
-              <a:t>9/13/2018</a:t>
+              <a:t>10/11/2018</a:t>
             </a:fld>
             <a:endParaRPr lang="en-US"/>
           </a:p>
@@ -2655,7 +2655,7 @@
           <a:lstStyle/>
           <a:p>
             <a:fld id="{7E83BB5F-FC7B-E342-A7CB-8A5E9A913100}" type="datetimeFigureOut">
-              <a:t>9/13/2018</a:t>
+              <a:t>10/11/2018</a:t>
             </a:fld>
             <a:endParaRPr lang="en-US"/>
           </a:p>
@@ -2894,7 +2894,7 @@
           </a:lstStyle>
           <a:p>
             <a:fld id="{7E83BB5F-FC7B-E342-A7CB-8A5E9A913100}" type="datetimeFigureOut">
-              <a:t>9/13/2018</a:t>
+              <a:t>10/11/2018</a:t>
             </a:fld>
             <a:endParaRPr lang="en-US"/>
           </a:p>
@@ -3324,7 +3324,7 @@
         </p:nvSpPr>
         <p:spPr>
           <a:xfrm>
-            <a:off x="200722" y="156117"/>
+            <a:off x="200722" y="375573"/>
             <a:ext cx="1489575" cy="369332"/>
           </a:xfrm>
           <a:prstGeom prst="rect">
@@ -3363,7 +3363,7 @@
         </p:nvCxnSpPr>
         <p:spPr>
           <a:xfrm flipH="1" flipV="1">
-            <a:off x="7869087" y="4820077"/>
+            <a:off x="7869087" y="3905677"/>
             <a:ext cx="1150932" cy="1201973"/>
           </a:xfrm>
           <a:prstGeom prst="straightConnector1">
@@ -3403,14 +3403,13 @@
           </p:cNvPr>
           <p:cNvCxnSpPr>
             <a:cxnSpLocks/>
-            <a:endCxn id="43" idx="0"/>
           </p:cNvCxnSpPr>
           <p:nvPr/>
         </p:nvCxnSpPr>
         <p:spPr>
           <a:xfrm flipH="1">
-            <a:off x="6165823" y="5626569"/>
-            <a:ext cx="400975" cy="395481"/>
+            <a:off x="6566798" y="4712169"/>
+            <a:ext cx="1" cy="395481"/>
           </a:xfrm>
           <a:prstGeom prst="straightConnector1">
             <a:avLst/>
@@ -3456,7 +3455,7 @@
         </p:nvCxnSpPr>
         <p:spPr>
           <a:xfrm>
-            <a:off x="5091114" y="5289558"/>
+            <a:off x="5091114" y="4375158"/>
             <a:ext cx="573329" cy="4745"/>
           </a:xfrm>
           <a:prstGeom prst="straightConnector1">
@@ -3504,7 +3503,7 @@
         </p:nvCxnSpPr>
         <p:spPr>
           <a:xfrm rot="16200000" flipH="1">
-            <a:off x="5375406" y="4709758"/>
+            <a:off x="5375406" y="3795358"/>
             <a:ext cx="4745" cy="1822265"/>
           </a:xfrm>
           <a:prstGeom prst="curvedConnector3">
@@ -3549,7 +3548,7 @@
         </p:nvSpPr>
         <p:spPr>
           <a:xfrm>
-            <a:off x="5541355" y="6022050"/>
+            <a:off x="5541355" y="5107650"/>
             <a:ext cx="1248936" cy="657922"/>
           </a:xfrm>
           <a:prstGeom prst="roundRect">
@@ -3584,13 +3583,18 @@
           <a:p>
             <a:pPr algn="ctr"/>
             <a:r>
-              <a:rPr lang="en-US" sz="1200">
+              <a:rPr lang="en-US" sz="1200" dirty="0" err="1">
                 <a:solidFill>
                   <a:schemeClr val="tx1"/>
                 </a:solidFill>
               </a:rPr>
-              <a:t>xsd:Token</a:t>
-            </a:r>
+              <a:t>xsd:token</a:t>
+            </a:r>
+            <a:endParaRPr lang="en-US" sz="1200" dirty="0">
+              <a:solidFill>
+                <a:schemeClr val="tx1"/>
+              </a:solidFill>
+            </a:endParaRPr>
           </a:p>
         </p:txBody>
       </p:sp>
@@ -3608,7 +3612,7 @@
         </p:nvSpPr>
         <p:spPr>
           <a:xfrm>
-            <a:off x="8841688" y="4968647"/>
+            <a:off x="8841688" y="4054247"/>
             <a:ext cx="1248936" cy="657922"/>
           </a:xfrm>
           <a:prstGeom prst="roundRect">
@@ -3697,7 +3701,7 @@
         </p:nvSpPr>
         <p:spPr>
           <a:xfrm>
-            <a:off x="3842178" y="4960597"/>
+            <a:off x="3842178" y="4046197"/>
             <a:ext cx="1248936" cy="657922"/>
           </a:xfrm>
           <a:prstGeom prst="roundRect">
@@ -3756,7 +3760,7 @@
         </p:nvSpPr>
         <p:spPr>
           <a:xfrm>
-            <a:off x="5664443" y="4965342"/>
+            <a:off x="5664443" y="4050942"/>
             <a:ext cx="1248936" cy="657922"/>
           </a:xfrm>
           <a:prstGeom prst="roundRect">
@@ -3791,12 +3795,12 @@
           <a:p>
             <a:pPr algn="ctr"/>
             <a:r>
-              <a:rPr lang="en-US" sz="1200">
+              <a:rPr lang="en-US" sz="1200" dirty="0">
                 <a:solidFill>
                   <a:schemeClr val="tx1"/>
                 </a:solidFill>
               </a:rPr>
-              <a:t>Implementation Profile</a:t>
+              <a:t>Profile</a:t>
             </a:r>
           </a:p>
         </p:txBody>
@@ -3818,7 +3822,7 @@
         </p:nvCxnSpPr>
         <p:spPr>
           <a:xfrm rot="16200000" flipH="1" flipV="1">
-            <a:off x="5891422" y="4732555"/>
+            <a:off x="5891422" y="3818155"/>
             <a:ext cx="164703" cy="630275"/>
           </a:xfrm>
           <a:prstGeom prst="curvedConnector4">
@@ -3864,7 +3868,7 @@
         </p:nvSpPr>
         <p:spPr>
           <a:xfrm>
-            <a:off x="10889088" y="4973322"/>
+            <a:off x="10889088" y="4058922"/>
             <a:ext cx="1248936" cy="657922"/>
           </a:xfrm>
           <a:prstGeom prst="roundRect">
@@ -3927,7 +3931,7 @@
         </p:nvCxnSpPr>
         <p:spPr>
           <a:xfrm flipV="1">
-            <a:off x="9020019" y="5626569"/>
+            <a:off x="9020019" y="4712169"/>
             <a:ext cx="446137" cy="395481"/>
           </a:xfrm>
           <a:prstGeom prst="straightConnector1">
@@ -3970,7 +3974,7 @@
         </p:nvSpPr>
         <p:spPr>
           <a:xfrm>
-            <a:off x="10889088" y="6022050"/>
+            <a:off x="10889088" y="5107650"/>
             <a:ext cx="1248936" cy="657922"/>
           </a:xfrm>
           <a:prstGeom prst="roundRect">
@@ -4005,12 +4009,12 @@
           <a:p>
             <a:pPr algn="ctr"/>
             <a:r>
-              <a:rPr lang="en-US" sz="1200">
+              <a:rPr lang="en-US" sz="1200" dirty="0">
                 <a:solidFill>
                   <a:schemeClr val="tx1"/>
                 </a:solidFill>
               </a:rPr>
-              <a:t>Implementation Resource Role</a:t>
+              <a:t>Resource Role</a:t>
             </a:r>
           </a:p>
         </p:txBody>
@@ -4033,7 +4037,7 @@
         </p:nvCxnSpPr>
         <p:spPr>
           <a:xfrm flipV="1">
-            <a:off x="11513556" y="5631244"/>
+            <a:off x="11513556" y="4716844"/>
             <a:ext cx="0" cy="390806"/>
           </a:xfrm>
           <a:prstGeom prst="straightConnector1">
@@ -4079,7 +4083,7 @@
         </p:nvCxnSpPr>
         <p:spPr>
           <a:xfrm flipV="1">
-            <a:off x="1351752" y="5788240"/>
+            <a:off x="1351752" y="4873840"/>
             <a:ext cx="0" cy="423747"/>
           </a:xfrm>
           <a:prstGeom prst="straightConnector1">
@@ -4123,7 +4127,7 @@
         </p:nvSpPr>
         <p:spPr>
           <a:xfrm>
-            <a:off x="1394035" y="5861613"/>
+            <a:off x="1394035" y="4947213"/>
             <a:ext cx="1145506" cy="276999"/>
           </a:xfrm>
           <a:prstGeom prst="rect">
@@ -4160,7 +4164,7 @@
         </p:nvSpPr>
         <p:spPr>
           <a:xfrm>
-            <a:off x="1301930" y="4938159"/>
+            <a:off x="1301930" y="4023759"/>
             <a:ext cx="1248936" cy="657922"/>
           </a:xfrm>
           <a:prstGeom prst="roundRect">
@@ -4221,7 +4225,7 @@
         </p:nvCxnSpPr>
         <p:spPr>
           <a:xfrm flipV="1">
-            <a:off x="2692455" y="5788239"/>
+            <a:off x="2692455" y="4873839"/>
             <a:ext cx="0" cy="423748"/>
           </a:xfrm>
           <a:prstGeom prst="straightConnector1">
@@ -4265,7 +4269,7 @@
         </p:nvSpPr>
         <p:spPr>
           <a:xfrm>
-            <a:off x="2728620" y="5861613"/>
+            <a:off x="2728620" y="4947213"/>
             <a:ext cx="727187" cy="276999"/>
           </a:xfrm>
           <a:prstGeom prst="rect">
@@ -4288,54 +4292,6 @@
           </a:p>
         </p:txBody>
       </p:sp>
-      <p:cxnSp>
-        <p:nvCxnSpPr>
-          <p:cNvPr id="32" name="Curved Connector 31">
-            <a:extLst>
-              <a:ext uri="{FF2B5EF4-FFF2-40B4-BE49-F238E27FC236}">
-                <a16:creationId xmlns:a16="http://schemas.microsoft.com/office/drawing/2014/main" id="{AF5BB75F-BF34-714F-933A-F464250E119A}"/>
-              </a:ext>
-            </a:extLst>
-          </p:cNvPr>
-          <p:cNvCxnSpPr>
-            <a:cxnSpLocks/>
-            <a:endCxn id="38" idx="1"/>
-          </p:cNvCxnSpPr>
-          <p:nvPr/>
-        </p:nvCxnSpPr>
-        <p:spPr>
-          <a:xfrm>
-            <a:off x="6907572" y="5464570"/>
-            <a:ext cx="1487979" cy="886441"/>
-          </a:xfrm>
-          <a:prstGeom prst="curvedConnector3">
-            <a:avLst>
-              <a:gd name="adj1" fmla="val 50000"/>
-            </a:avLst>
-          </a:prstGeom>
-          <a:ln>
-            <a:solidFill>
-              <a:schemeClr val="tx1"/>
-            </a:solidFill>
-            <a:headEnd type="none" w="med" len="med"/>
-            <a:tailEnd type="arrow" w="med" len="med"/>
-          </a:ln>
-        </p:spPr>
-        <p:style>
-          <a:lnRef idx="1">
-            <a:schemeClr val="accent1"/>
-          </a:lnRef>
-          <a:fillRef idx="0">
-            <a:schemeClr val="accent1"/>
-          </a:fillRef>
-          <a:effectRef idx="0">
-            <a:schemeClr val="accent1"/>
-          </a:effectRef>
-          <a:fontRef idx="minor">
-            <a:schemeClr val="tx1"/>
-          </a:fontRef>
-        </p:style>
-      </p:cxnSp>
       <p:sp>
         <p:nvSpPr>
           <p:cNvPr id="39" name="Rounded Rectangle 38">
@@ -4350,7 +4306,7 @@
         </p:nvSpPr>
         <p:spPr>
           <a:xfrm>
-            <a:off x="7244619" y="4162155"/>
+            <a:off x="7244619" y="3247755"/>
             <a:ext cx="1248936" cy="657922"/>
           </a:xfrm>
           <a:prstGeom prst="roundRect">
@@ -4413,7 +4369,7 @@
         </p:nvCxnSpPr>
         <p:spPr>
           <a:xfrm flipV="1">
-            <a:off x="6913379" y="4820077"/>
+            <a:off x="6913379" y="3905677"/>
             <a:ext cx="955708" cy="474226"/>
           </a:xfrm>
           <a:prstGeom prst="straightConnector1">
@@ -4457,7 +4413,7 @@
         </p:nvSpPr>
         <p:spPr>
           <a:xfrm>
-            <a:off x="8395551" y="6022050"/>
+            <a:off x="8395551" y="5107650"/>
             <a:ext cx="1248936" cy="657922"/>
           </a:xfrm>
           <a:prstGeom prst="roundRect">
@@ -4492,12 +4448,12 @@
           <a:p>
             <a:pPr algn="ctr"/>
             <a:r>
-              <a:rPr lang="en-US" sz="1200">
+              <a:rPr lang="en-US" sz="1200" dirty="0">
                 <a:solidFill>
                   <a:schemeClr val="tx1"/>
                 </a:solidFill>
               </a:rPr>
-              <a:t>Implementation Resource Descriptor</a:t>
+              <a:t>Resource Descriptor</a:t>
             </a:r>
           </a:p>
         </p:txBody>
@@ -4516,7 +4472,7 @@
         </p:nvSpPr>
         <p:spPr>
           <a:xfrm>
-            <a:off x="1256465" y="4507558"/>
+            <a:off x="1256465" y="3593158"/>
             <a:ext cx="1090683" cy="307777"/>
           </a:xfrm>
           <a:prstGeom prst="rect">
@@ -4554,7 +4510,7 @@
         </p:nvCxnSpPr>
         <p:spPr>
           <a:xfrm rot="16200000" flipH="1">
-            <a:off x="9029131" y="2488898"/>
+            <a:off x="9029131" y="1574498"/>
             <a:ext cx="12728" cy="4956121"/>
           </a:xfrm>
           <a:prstGeom prst="curvedConnector3">
@@ -4600,7 +4556,7 @@
         </p:nvSpPr>
         <p:spPr>
           <a:xfrm>
-            <a:off x="7698594" y="5067441"/>
+            <a:off x="7698594" y="4153041"/>
             <a:ext cx="970009" cy="184666"/>
           </a:xfrm>
           <a:prstGeom prst="rect">
@@ -4638,7 +4594,7 @@
         </p:nvSpPr>
         <p:spPr>
           <a:xfrm>
-            <a:off x="4596969" y="5723124"/>
+            <a:off x="4596969" y="4808724"/>
             <a:ext cx="776559" cy="184666"/>
           </a:xfrm>
           <a:prstGeom prst="rect">
@@ -4679,7 +4635,7 @@
         </p:nvSpPr>
         <p:spPr>
           <a:xfrm>
-            <a:off x="6261058" y="5745052"/>
+            <a:off x="6418206" y="4808724"/>
             <a:ext cx="354264" cy="184666"/>
           </a:xfrm>
           <a:prstGeom prst="rect">
@@ -4716,7 +4672,7 @@
         </p:nvSpPr>
         <p:spPr>
           <a:xfrm>
-            <a:off x="4898113" y="4302675"/>
+            <a:off x="4898113" y="3388275"/>
             <a:ext cx="1539769" cy="184666"/>
           </a:xfrm>
           <a:prstGeom prst="rect">
@@ -4762,7 +4718,7 @@
         </p:nvSpPr>
         <p:spPr>
           <a:xfrm>
-            <a:off x="9862107" y="6130747"/>
+            <a:off x="9862107" y="5216347"/>
             <a:ext cx="823559" cy="184666"/>
           </a:xfrm>
           <a:prstGeom prst="rect">
@@ -4788,10 +4744,10 @@
       </p:sp>
       <p:sp>
         <p:nvSpPr>
-          <p:cNvPr id="36" name="TextBox 35">
-            <a:extLst>
-              <a:ext uri="{FF2B5EF4-FFF2-40B4-BE49-F238E27FC236}">
-                <a16:creationId xmlns:a16="http://schemas.microsoft.com/office/drawing/2014/main" id="{2439A7AD-5BC1-1140-9CFD-EB5B337D12EB}"/>
+          <p:cNvPr id="19" name="TextBox 18">
+            <a:extLst>
+              <a:ext uri="{FF2B5EF4-FFF2-40B4-BE49-F238E27FC236}">
+                <a16:creationId xmlns:a16="http://schemas.microsoft.com/office/drawing/2014/main" id="{A3F35545-D886-F341-9736-B188651A95C8}"/>
               </a:ext>
             </a:extLst>
           </p:cNvPr>
@@ -4800,8 +4756,8 @@
         </p:nvSpPr>
         <p:spPr>
           <a:xfrm>
-            <a:off x="7277891" y="5945063"/>
-            <a:ext cx="543931" cy="184666"/>
+            <a:off x="9068858" y="4833491"/>
+            <a:ext cx="684865" cy="184666"/>
           </a:xfrm>
           <a:prstGeom prst="rect">
             <a:avLst/>
@@ -4811,43 +4767,6 @@
           </a:solidFill>
         </p:spPr>
         <p:txBody>
-          <a:bodyPr wrap="none" lIns="0" tIns="0" rIns="0" bIns="0" rtlCol="0">
-            <a:spAutoFit/>
-          </a:bodyPr>
-          <a:lstStyle/>
-          <a:p>
-            <a:r>
-              <a:rPr lang="en-US" sz="1200" dirty="0"/>
-              <a:t>resource</a:t>
-            </a:r>
-          </a:p>
-        </p:txBody>
-      </p:sp>
-      <p:sp>
-        <p:nvSpPr>
-          <p:cNvPr id="19" name="TextBox 18">
-            <a:extLst>
-              <a:ext uri="{FF2B5EF4-FFF2-40B4-BE49-F238E27FC236}">
-                <a16:creationId xmlns:a16="http://schemas.microsoft.com/office/drawing/2014/main" id="{A3F35545-D886-F341-9736-B188651A95C8}"/>
-              </a:ext>
-            </a:extLst>
-          </p:cNvPr>
-          <p:cNvSpPr txBox="1"/>
-          <p:nvPr/>
-        </p:nvSpPr>
-        <p:spPr>
-          <a:xfrm>
-            <a:off x="9068858" y="5747891"/>
-            <a:ext cx="684865" cy="184666"/>
-          </a:xfrm>
-          <a:prstGeom prst="rect">
-            <a:avLst/>
-          </a:prstGeom>
-          <a:solidFill>
-            <a:schemeClr val="bg1"/>
-          </a:solidFill>
-        </p:spPr>
-        <p:txBody>
           <a:bodyPr wrap="square" lIns="0" tIns="0" rIns="0" bIns="0" rtlCol="0">
             <a:spAutoFit/>
           </a:bodyPr>
@@ -4856,92 +4775,6 @@
             <a:r>
               <a:rPr lang="en-US" sz="1200" dirty="0" err="1"/>
               <a:t>dct:format</a:t>
-            </a:r>
-            <a:endParaRPr lang="en-US" sz="1200" dirty="0"/>
-          </a:p>
-        </p:txBody>
-      </p:sp>
-      <p:cxnSp>
-        <p:nvCxnSpPr>
-          <p:cNvPr id="44" name="Curved Connector 31">
-            <a:extLst>
-              <a:ext uri="{FF2B5EF4-FFF2-40B4-BE49-F238E27FC236}">
-                <a16:creationId xmlns:a16="http://schemas.microsoft.com/office/drawing/2014/main" id="{EEB2D649-64E6-4D05-9C10-B19B865B4489}"/>
-              </a:ext>
-            </a:extLst>
-          </p:cNvPr>
-          <p:cNvCxnSpPr>
-            <a:cxnSpLocks/>
-            <a:stCxn id="38" idx="2"/>
-          </p:cNvCxnSpPr>
-          <p:nvPr/>
-        </p:nvCxnSpPr>
-        <p:spPr>
-          <a:xfrm rot="5400000" flipH="1">
-            <a:off x="7376332" y="5036286"/>
-            <a:ext cx="1061971" cy="2225402"/>
-          </a:xfrm>
-          <a:prstGeom prst="curvedConnector3">
-            <a:avLst>
-              <a:gd name="adj1" fmla="val -11591"/>
-            </a:avLst>
-          </a:prstGeom>
-          <a:ln>
-            <a:solidFill>
-              <a:schemeClr val="tx1"/>
-            </a:solidFill>
-            <a:headEnd type="none" w="med" len="med"/>
-            <a:tailEnd type="arrow" w="med" len="med"/>
-          </a:ln>
-        </p:spPr>
-        <p:style>
-          <a:lnRef idx="1">
-            <a:schemeClr val="accent1"/>
-          </a:lnRef>
-          <a:fillRef idx="0">
-            <a:schemeClr val="accent1"/>
-          </a:fillRef>
-          <a:effectRef idx="0">
-            <a:schemeClr val="accent1"/>
-          </a:effectRef>
-          <a:fontRef idx="minor">
-            <a:schemeClr val="tx1"/>
-          </a:fontRef>
-        </p:style>
-      </p:cxnSp>
-      <p:sp>
-        <p:nvSpPr>
-          <p:cNvPr id="46" name="TextBox 45">
-            <a:extLst>
-              <a:ext uri="{FF2B5EF4-FFF2-40B4-BE49-F238E27FC236}">
-                <a16:creationId xmlns:a16="http://schemas.microsoft.com/office/drawing/2014/main" id="{5FB455BE-701D-4332-AAA3-96ADC53BBE2F}"/>
-              </a:ext>
-            </a:extLst>
-          </p:cNvPr>
-          <p:cNvSpPr txBox="1"/>
-          <p:nvPr/>
-        </p:nvSpPr>
-        <p:spPr>
-          <a:xfrm>
-            <a:off x="6920686" y="6471141"/>
-            <a:ext cx="904735" cy="184666"/>
-          </a:xfrm>
-          <a:prstGeom prst="rect">
-            <a:avLst/>
-          </a:prstGeom>
-          <a:solidFill>
-            <a:schemeClr val="bg1"/>
-          </a:solidFill>
-        </p:spPr>
-        <p:txBody>
-          <a:bodyPr wrap="none" lIns="0" tIns="0" rIns="0" bIns="0" rtlCol="0">
-            <a:spAutoFit/>
-          </a:bodyPr>
-          <a:lstStyle/>
-          <a:p>
-            <a:r>
-              <a:rPr lang="en-US" sz="1200" dirty="0" err="1"/>
-              <a:t>inherited from</a:t>
             </a:r>
             <a:endParaRPr lang="en-US" sz="1200" dirty="0"/>
           </a:p>
@@ -4965,7 +4798,7 @@
         </p:nvCxnSpPr>
         <p:spPr>
           <a:xfrm>
-            <a:off x="9644487" y="6351011"/>
+            <a:off x="9644487" y="5436611"/>
             <a:ext cx="1244601" cy="0"/>
           </a:xfrm>
           <a:prstGeom prst="straightConnector1">
@@ -4994,6 +4827,316 @@
           </a:fontRef>
         </p:style>
       </p:cxnSp>
+      <p:sp>
+        <p:nvSpPr>
+          <p:cNvPr id="47" name="Rounded Rectangle 182">
+            <a:extLst>
+              <a:ext uri="{FF2B5EF4-FFF2-40B4-BE49-F238E27FC236}">
+                <a16:creationId xmlns:a16="http://schemas.microsoft.com/office/drawing/2014/main" id="{EFB09EAB-C7F2-4B65-A45F-482A5685C8DF}"/>
+              </a:ext>
+            </a:extLst>
+          </p:cNvPr>
+          <p:cNvSpPr/>
+          <p:nvPr/>
+        </p:nvSpPr>
+        <p:spPr>
+          <a:xfrm>
+            <a:off x="9753723" y="6145327"/>
+            <a:ext cx="1248936" cy="657922"/>
+          </a:xfrm>
+          <a:prstGeom prst="roundRect">
+            <a:avLst/>
+          </a:prstGeom>
+          <a:noFill/>
+          <a:ln>
+            <a:solidFill>
+              <a:schemeClr val="tx1"/>
+            </a:solidFill>
+          </a:ln>
+        </p:spPr>
+        <p:style>
+          <a:lnRef idx="2">
+            <a:schemeClr val="accent1">
+              <a:shade val="50000"/>
+            </a:schemeClr>
+          </a:lnRef>
+          <a:fillRef idx="1">
+            <a:schemeClr val="accent1"/>
+          </a:fillRef>
+          <a:effectRef idx="0">
+            <a:schemeClr val="accent1"/>
+          </a:effectRef>
+          <a:fontRef idx="minor">
+            <a:schemeClr val="lt1"/>
+          </a:fontRef>
+        </p:style>
+        <p:txBody>
+          <a:bodyPr rtlCol="0" anchor="ctr"/>
+          <a:lstStyle/>
+          <a:p>
+            <a:pPr algn="ctr"/>
+            <a:r>
+              <a:rPr lang="en-US" sz="1200" dirty="0">
+                <a:solidFill>
+                  <a:schemeClr val="tx1"/>
+                </a:solidFill>
+              </a:rPr>
+              <a:t>Resource</a:t>
+            </a:r>
+          </a:p>
+        </p:txBody>
+      </p:sp>
+      <p:cxnSp>
+        <p:nvCxnSpPr>
+          <p:cNvPr id="49" name="Straight Arrow Connector 48">
+            <a:extLst>
+              <a:ext uri="{FF2B5EF4-FFF2-40B4-BE49-F238E27FC236}">
+                <a16:creationId xmlns:a16="http://schemas.microsoft.com/office/drawing/2014/main" id="{BF1CFF90-8E3D-45BD-80A5-7EEBDB26996C}"/>
+              </a:ext>
+            </a:extLst>
+          </p:cNvPr>
+          <p:cNvCxnSpPr>
+            <a:cxnSpLocks/>
+            <a:stCxn id="38" idx="3"/>
+            <a:endCxn id="47" idx="0"/>
+          </p:cNvCxnSpPr>
+          <p:nvPr/>
+        </p:nvCxnSpPr>
+        <p:spPr>
+          <a:xfrm>
+            <a:off x="9644487" y="5436611"/>
+            <a:ext cx="733704" cy="708716"/>
+          </a:xfrm>
+          <a:prstGeom prst="straightConnector1">
+            <a:avLst/>
+          </a:prstGeom>
+          <a:ln>
+            <a:solidFill>
+              <a:schemeClr val="tx1"/>
+            </a:solidFill>
+            <a:headEnd type="none" w="med" len="med"/>
+            <a:tailEnd type="arrow" w="med" len="med"/>
+          </a:ln>
+        </p:spPr>
+        <p:style>
+          <a:lnRef idx="1">
+            <a:schemeClr val="accent1"/>
+          </a:lnRef>
+          <a:fillRef idx="0">
+            <a:schemeClr val="accent1"/>
+          </a:fillRef>
+          <a:effectRef idx="0">
+            <a:schemeClr val="accent1"/>
+          </a:effectRef>
+          <a:fontRef idx="minor">
+            <a:schemeClr val="tx1"/>
+          </a:fontRef>
+        </p:style>
+      </p:cxnSp>
+      <p:sp>
+        <p:nvSpPr>
+          <p:cNvPr id="50" name="TextBox 49">
+            <a:extLst>
+              <a:ext uri="{FF2B5EF4-FFF2-40B4-BE49-F238E27FC236}">
+                <a16:creationId xmlns:a16="http://schemas.microsoft.com/office/drawing/2014/main" id="{22FD51B1-AE57-434C-A625-7B81DF44ED7D}"/>
+              </a:ext>
+            </a:extLst>
+          </p:cNvPr>
+          <p:cNvSpPr txBox="1"/>
+          <p:nvPr/>
+        </p:nvSpPr>
+        <p:spPr>
+          <a:xfrm>
+            <a:off x="9738412" y="5650315"/>
+            <a:ext cx="486095" cy="184666"/>
+          </a:xfrm>
+          <a:prstGeom prst="rect">
+            <a:avLst/>
+          </a:prstGeom>
+          <a:solidFill>
+            <a:schemeClr val="bg1"/>
+          </a:solidFill>
+        </p:spPr>
+        <p:txBody>
+          <a:bodyPr wrap="none" lIns="0" tIns="0" rIns="0" bIns="0" rtlCol="0">
+            <a:spAutoFit/>
+          </a:bodyPr>
+          <a:lstStyle/>
+          <a:p>
+            <a:r>
+              <a:rPr lang="en-US" sz="1200" dirty="0"/>
+              <a:t>artefact</a:t>
+            </a:r>
+          </a:p>
+        </p:txBody>
+      </p:sp>
+      <p:cxnSp>
+        <p:nvCxnSpPr>
+          <p:cNvPr id="51" name="Straight Arrow Connector 50">
+            <a:extLst>
+              <a:ext uri="{FF2B5EF4-FFF2-40B4-BE49-F238E27FC236}">
+                <a16:creationId xmlns:a16="http://schemas.microsoft.com/office/drawing/2014/main" id="{3FE75ACA-CB50-49F4-81EE-8CC3773D5A6E}"/>
+              </a:ext>
+            </a:extLst>
+          </p:cNvPr>
+          <p:cNvCxnSpPr>
+            <a:cxnSpLocks/>
+            <a:stCxn id="20" idx="3"/>
+          </p:cNvCxnSpPr>
+          <p:nvPr/>
+        </p:nvCxnSpPr>
+        <p:spPr>
+          <a:xfrm>
+            <a:off x="6913379" y="4379903"/>
+            <a:ext cx="1495755" cy="769943"/>
+          </a:xfrm>
+          <a:prstGeom prst="straightConnector1">
+            <a:avLst/>
+          </a:prstGeom>
+          <a:ln>
+            <a:solidFill>
+              <a:schemeClr val="tx1"/>
+            </a:solidFill>
+            <a:headEnd type="none" w="med" len="med"/>
+            <a:tailEnd type="arrow" w="med" len="med"/>
+          </a:ln>
+        </p:spPr>
+        <p:style>
+          <a:lnRef idx="1">
+            <a:schemeClr val="accent1"/>
+          </a:lnRef>
+          <a:fillRef idx="0">
+            <a:schemeClr val="accent1"/>
+          </a:fillRef>
+          <a:effectRef idx="0">
+            <a:schemeClr val="accent1"/>
+          </a:effectRef>
+          <a:fontRef idx="minor">
+            <a:schemeClr val="tx1"/>
+          </a:fontRef>
+        </p:style>
+      </p:cxnSp>
+      <p:sp>
+        <p:nvSpPr>
+          <p:cNvPr id="36" name="TextBox 35">
+            <a:extLst>
+              <a:ext uri="{FF2B5EF4-FFF2-40B4-BE49-F238E27FC236}">
+                <a16:creationId xmlns:a16="http://schemas.microsoft.com/office/drawing/2014/main" id="{2439A7AD-5BC1-1140-9CFD-EB5B337D12EB}"/>
+              </a:ext>
+            </a:extLst>
+          </p:cNvPr>
+          <p:cNvSpPr txBox="1"/>
+          <p:nvPr/>
+        </p:nvSpPr>
+        <p:spPr>
+          <a:xfrm>
+            <a:off x="7425006" y="4683843"/>
+            <a:ext cx="543931" cy="184666"/>
+          </a:xfrm>
+          <a:prstGeom prst="rect">
+            <a:avLst/>
+          </a:prstGeom>
+          <a:solidFill>
+            <a:schemeClr val="bg1"/>
+          </a:solidFill>
+        </p:spPr>
+        <p:txBody>
+          <a:bodyPr wrap="none" lIns="0" tIns="0" rIns="0" bIns="0" rtlCol="0">
+            <a:spAutoFit/>
+          </a:bodyPr>
+          <a:lstStyle/>
+          <a:p>
+            <a:r>
+              <a:rPr lang="en-US" sz="1200" dirty="0"/>
+              <a:t>resource</a:t>
+            </a:r>
+          </a:p>
+        </p:txBody>
+      </p:sp>
+      <p:cxnSp>
+        <p:nvCxnSpPr>
+          <p:cNvPr id="52" name="Straight Arrow Connector 51">
+            <a:extLst>
+              <a:ext uri="{FF2B5EF4-FFF2-40B4-BE49-F238E27FC236}">
+                <a16:creationId xmlns:a16="http://schemas.microsoft.com/office/drawing/2014/main" id="{0E677052-7D57-4F0F-907C-A1B6ADAB18B3}"/>
+              </a:ext>
+            </a:extLst>
+          </p:cNvPr>
+          <p:cNvCxnSpPr>
+            <a:cxnSpLocks/>
+            <a:stCxn id="38" idx="1"/>
+          </p:cNvCxnSpPr>
+          <p:nvPr/>
+        </p:nvCxnSpPr>
+        <p:spPr>
+          <a:xfrm flipH="1" flipV="1">
+            <a:off x="6878670" y="4683843"/>
+            <a:ext cx="1516881" cy="752768"/>
+          </a:xfrm>
+          <a:prstGeom prst="straightConnector1">
+            <a:avLst/>
+          </a:prstGeom>
+          <a:ln>
+            <a:solidFill>
+              <a:schemeClr val="tx1"/>
+            </a:solidFill>
+            <a:headEnd type="none" w="med" len="med"/>
+            <a:tailEnd type="arrow" w="med" len="med"/>
+          </a:ln>
+        </p:spPr>
+        <p:style>
+          <a:lnRef idx="1">
+            <a:schemeClr val="accent1"/>
+          </a:lnRef>
+          <a:fillRef idx="0">
+            <a:schemeClr val="accent1"/>
+          </a:fillRef>
+          <a:effectRef idx="0">
+            <a:schemeClr val="accent1"/>
+          </a:effectRef>
+          <a:fontRef idx="minor">
+            <a:schemeClr val="tx1"/>
+          </a:fontRef>
+        </p:style>
+      </p:cxnSp>
+      <p:sp>
+        <p:nvSpPr>
+          <p:cNvPr id="46" name="TextBox 45">
+            <a:extLst>
+              <a:ext uri="{FF2B5EF4-FFF2-40B4-BE49-F238E27FC236}">
+                <a16:creationId xmlns:a16="http://schemas.microsoft.com/office/drawing/2014/main" id="{5FB455BE-701D-4332-AAA3-96ADC53BBE2F}"/>
+              </a:ext>
+            </a:extLst>
+          </p:cNvPr>
+          <p:cNvSpPr txBox="1"/>
+          <p:nvPr/>
+        </p:nvSpPr>
+        <p:spPr>
+          <a:xfrm>
+            <a:off x="7182232" y="5027508"/>
+            <a:ext cx="904735" cy="184666"/>
+          </a:xfrm>
+          <a:prstGeom prst="rect">
+            <a:avLst/>
+          </a:prstGeom>
+          <a:solidFill>
+            <a:schemeClr val="bg1"/>
+          </a:solidFill>
+        </p:spPr>
+        <p:txBody>
+          <a:bodyPr wrap="none" lIns="0" tIns="0" rIns="0" bIns="0" rtlCol="0">
+            <a:spAutoFit/>
+          </a:bodyPr>
+          <a:lstStyle/>
+          <a:p>
+            <a:r>
+              <a:rPr lang="en-US" sz="1200" dirty="0" err="1"/>
+              <a:t>inherited from</a:t>
+            </a:r>
+            <a:endParaRPr lang="en-US" sz="1200" dirty="0"/>
+          </a:p>
+        </p:txBody>
+      </p:sp>
     </p:spTree>
     <p:extLst>
       <p:ext uri="{BB962C8B-B14F-4D97-AF65-F5344CB8AC3E}">

</xml_diff>

<commit_message>
DCAT-AP example - incomplete
</commit_message>
<xml_diff>
--- a/profilesont/diagrams.pptx
+++ b/profilesont/diagrams.pptx
@@ -266,7 +266,7 @@
           <a:lstStyle/>
           <a:p>
             <a:fld id="{7E83BB5F-FC7B-E342-A7CB-8A5E9A913100}" type="datetimeFigureOut">
-              <a:t>10/11/2018</a:t>
+              <a:t>10/31/2018</a:t>
             </a:fld>
             <a:endParaRPr lang="en-US"/>
           </a:p>
@@ -462,7 +462,7 @@
           <a:lstStyle/>
           <a:p>
             <a:fld id="{7E83BB5F-FC7B-E342-A7CB-8A5E9A913100}" type="datetimeFigureOut">
-              <a:t>10/11/2018</a:t>
+              <a:t>10/31/2018</a:t>
             </a:fld>
             <a:endParaRPr lang="en-US"/>
           </a:p>
@@ -668,7 +668,7 @@
           <a:lstStyle/>
           <a:p>
             <a:fld id="{7E83BB5F-FC7B-E342-A7CB-8A5E9A913100}" type="datetimeFigureOut">
-              <a:t>10/11/2018</a:t>
+              <a:t>10/31/2018</a:t>
             </a:fld>
             <a:endParaRPr lang="en-US"/>
           </a:p>
@@ -864,7 +864,7 @@
           <a:lstStyle/>
           <a:p>
             <a:fld id="{7E83BB5F-FC7B-E342-A7CB-8A5E9A913100}" type="datetimeFigureOut">
-              <a:t>10/11/2018</a:t>
+              <a:t>10/31/2018</a:t>
             </a:fld>
             <a:endParaRPr lang="en-US"/>
           </a:p>
@@ -1137,7 +1137,7 @@
           <a:lstStyle/>
           <a:p>
             <a:fld id="{7E83BB5F-FC7B-E342-A7CB-8A5E9A913100}" type="datetimeFigureOut">
-              <a:t>10/11/2018</a:t>
+              <a:t>10/31/2018</a:t>
             </a:fld>
             <a:endParaRPr lang="en-US"/>
           </a:p>
@@ -1400,7 +1400,7 @@
           <a:lstStyle/>
           <a:p>
             <a:fld id="{7E83BB5F-FC7B-E342-A7CB-8A5E9A913100}" type="datetimeFigureOut">
-              <a:t>10/11/2018</a:t>
+              <a:t>10/31/2018</a:t>
             </a:fld>
             <a:endParaRPr lang="en-US"/>
           </a:p>
@@ -1810,7 +1810,7 @@
           <a:lstStyle/>
           <a:p>
             <a:fld id="{7E83BB5F-FC7B-E342-A7CB-8A5E9A913100}" type="datetimeFigureOut">
-              <a:t>10/11/2018</a:t>
+              <a:t>10/31/2018</a:t>
             </a:fld>
             <a:endParaRPr lang="en-US"/>
           </a:p>
@@ -1949,7 +1949,7 @@
           <a:lstStyle/>
           <a:p>
             <a:fld id="{7E83BB5F-FC7B-E342-A7CB-8A5E9A913100}" type="datetimeFigureOut">
-              <a:t>10/11/2018</a:t>
+              <a:t>10/31/2018</a:t>
             </a:fld>
             <a:endParaRPr lang="en-US"/>
           </a:p>
@@ -2060,7 +2060,7 @@
           <a:lstStyle/>
           <a:p>
             <a:fld id="{7E83BB5F-FC7B-E342-A7CB-8A5E9A913100}" type="datetimeFigureOut">
-              <a:t>10/11/2018</a:t>
+              <a:t>10/31/2018</a:t>
             </a:fld>
             <a:endParaRPr lang="en-US"/>
           </a:p>
@@ -2369,7 +2369,7 @@
           <a:lstStyle/>
           <a:p>
             <a:fld id="{7E83BB5F-FC7B-E342-A7CB-8A5E9A913100}" type="datetimeFigureOut">
-              <a:t>10/11/2018</a:t>
+              <a:t>10/31/2018</a:t>
             </a:fld>
             <a:endParaRPr lang="en-US"/>
           </a:p>
@@ -2655,7 +2655,7 @@
           <a:lstStyle/>
           <a:p>
             <a:fld id="{7E83BB5F-FC7B-E342-A7CB-8A5E9A913100}" type="datetimeFigureOut">
-              <a:t>10/11/2018</a:t>
+              <a:t>10/31/2018</a:t>
             </a:fld>
             <a:endParaRPr lang="en-US"/>
           </a:p>
@@ -2894,7 +2894,7 @@
           </a:lstStyle>
           <a:p>
             <a:fld id="{7E83BB5F-FC7B-E342-A7CB-8A5E9A913100}" type="datetimeFigureOut">
-              <a:t>10/11/2018</a:t>
+              <a:t>10/31/2018</a:t>
             </a:fld>
             <a:endParaRPr lang="en-US"/>
           </a:p>
@@ -3347,69 +3347,24 @@
       </p:sp>
       <p:cxnSp>
         <p:nvCxnSpPr>
-          <p:cNvPr id="15" name="Straight Arrow Connector 14">
-            <a:extLst>
-              <a:ext uri="{FF2B5EF4-FFF2-40B4-BE49-F238E27FC236}">
-                <a16:creationId xmlns:a16="http://schemas.microsoft.com/office/drawing/2014/main" id="{EB830C7E-D432-0045-B1FA-AEB27F07E814}"/>
+          <p:cNvPr id="24" name="Straight Arrow Connector 23">
+            <a:extLst>
+              <a:ext uri="{FF2B5EF4-FFF2-40B4-BE49-F238E27FC236}">
+                <a16:creationId xmlns:a16="http://schemas.microsoft.com/office/drawing/2014/main" id="{9FBC0AA1-972E-5849-9EC0-816B59BC0805}"/>
               </a:ext>
             </a:extLst>
           </p:cNvPr>
           <p:cNvCxnSpPr>
             <a:cxnSpLocks/>
-            <a:stCxn id="38" idx="0"/>
-            <a:endCxn id="39" idx="2"/>
+            <a:stCxn id="20" idx="3"/>
+            <a:endCxn id="43" idx="0"/>
           </p:cNvCxnSpPr>
           <p:nvPr/>
         </p:nvCxnSpPr>
         <p:spPr>
-          <a:xfrm flipH="1" flipV="1">
-            <a:off x="7869087" y="3905677"/>
-            <a:ext cx="1150932" cy="1201973"/>
-          </a:xfrm>
-          <a:prstGeom prst="straightConnector1">
-            <a:avLst/>
-          </a:prstGeom>
-          <a:ln>
-            <a:solidFill>
-              <a:schemeClr val="tx1"/>
-            </a:solidFill>
-            <a:headEnd type="none" w="med" len="med"/>
-            <a:tailEnd type="arrow" w="med" len="med"/>
-          </a:ln>
-        </p:spPr>
-        <p:style>
-          <a:lnRef idx="1">
-            <a:schemeClr val="accent1"/>
-          </a:lnRef>
-          <a:fillRef idx="0">
-            <a:schemeClr val="accent1"/>
-          </a:fillRef>
-          <a:effectRef idx="0">
-            <a:schemeClr val="accent1"/>
-          </a:effectRef>
-          <a:fontRef idx="minor">
-            <a:schemeClr val="tx1"/>
-          </a:fontRef>
-        </p:style>
-      </p:cxnSp>
-      <p:cxnSp>
-        <p:nvCxnSpPr>
-          <p:cNvPr id="24" name="Straight Arrow Connector 23">
-            <a:extLst>
-              <a:ext uri="{FF2B5EF4-FFF2-40B4-BE49-F238E27FC236}">
-                <a16:creationId xmlns:a16="http://schemas.microsoft.com/office/drawing/2014/main" id="{9FBC0AA1-972E-5849-9EC0-816B59BC0805}"/>
-              </a:ext>
-            </a:extLst>
-          </p:cNvPr>
-          <p:cNvCxnSpPr>
-            <a:cxnSpLocks/>
-          </p:cNvCxnSpPr>
-          <p:nvPr/>
-        </p:nvCxnSpPr>
-        <p:spPr>
-          <a:xfrm flipH="1">
-            <a:off x="6566798" y="4712169"/>
-            <a:ext cx="1" cy="395481"/>
+          <a:xfrm>
+            <a:off x="7245887" y="4022098"/>
+            <a:ext cx="1263235" cy="986539"/>
           </a:xfrm>
           <a:prstGeom prst="straightConnector1">
             <a:avLst/>
@@ -3448,15 +3403,13 @@
           </p:cNvPr>
           <p:cNvCxnSpPr>
             <a:cxnSpLocks/>
-            <a:stCxn id="14" idx="3"/>
-            <a:endCxn id="20" idx="1"/>
           </p:cNvCxnSpPr>
           <p:nvPr/>
         </p:nvCxnSpPr>
         <p:spPr>
-          <a:xfrm>
-            <a:off x="5091114" y="4375158"/>
-            <a:ext cx="573329" cy="4745"/>
+          <a:xfrm flipV="1">
+            <a:off x="5415939" y="3823319"/>
+            <a:ext cx="581012" cy="7980"/>
           </a:xfrm>
           <a:prstGeom prst="straightConnector1">
             <a:avLst/>
@@ -3485,55 +3438,6 @@
           </a:fontRef>
         </p:style>
       </p:cxnSp>
-      <p:cxnSp>
-        <p:nvCxnSpPr>
-          <p:cNvPr id="90" name="Curved Connector 89">
-            <a:extLst>
-              <a:ext uri="{FF2B5EF4-FFF2-40B4-BE49-F238E27FC236}">
-                <a16:creationId xmlns:a16="http://schemas.microsoft.com/office/drawing/2014/main" id="{1745EB0B-5256-A846-8409-0935D2FF0BDD}"/>
-              </a:ext>
-            </a:extLst>
-          </p:cNvPr>
-          <p:cNvCxnSpPr>
-            <a:cxnSpLocks/>
-            <a:stCxn id="14" idx="2"/>
-            <a:endCxn id="20" idx="2"/>
-          </p:cNvCxnSpPr>
-          <p:nvPr/>
-        </p:nvCxnSpPr>
-        <p:spPr>
-          <a:xfrm rot="16200000" flipH="1">
-            <a:off x="5375406" y="3795358"/>
-            <a:ext cx="4745" cy="1822265"/>
-          </a:xfrm>
-          <a:prstGeom prst="curvedConnector3">
-            <a:avLst>
-              <a:gd name="adj1" fmla="val 4917703"/>
-            </a:avLst>
-          </a:prstGeom>
-          <a:ln>
-            <a:solidFill>
-              <a:schemeClr val="tx1"/>
-            </a:solidFill>
-            <a:headEnd type="none" w="med" len="med"/>
-            <a:tailEnd type="arrow" w="med" len="med"/>
-          </a:ln>
-        </p:spPr>
-        <p:style>
-          <a:lnRef idx="1">
-            <a:schemeClr val="accent1"/>
-          </a:lnRef>
-          <a:fillRef idx="0">
-            <a:schemeClr val="accent1"/>
-          </a:fillRef>
-          <a:effectRef idx="0">
-            <a:schemeClr val="accent1"/>
-          </a:effectRef>
-          <a:fontRef idx="minor">
-            <a:schemeClr val="tx1"/>
-          </a:fontRef>
-        </p:style>
-      </p:cxnSp>
       <p:sp>
         <p:nvSpPr>
           <p:cNvPr id="43" name="Rounded Rectangle 42">
@@ -3548,7 +3452,7 @@
         </p:nvSpPr>
         <p:spPr>
           <a:xfrm>
-            <a:off x="5541355" y="5107650"/>
+            <a:off x="7884654" y="5008637"/>
             <a:ext cx="1248936" cy="657922"/>
           </a:xfrm>
           <a:prstGeom prst="roundRect">
@@ -3612,7 +3516,7 @@
         </p:nvSpPr>
         <p:spPr>
           <a:xfrm>
-            <a:off x="8841688" y="4054247"/>
+            <a:off x="4166339" y="5008981"/>
             <a:ext cx="1248936" cy="657922"/>
           </a:xfrm>
           <a:prstGeom prst="roundRect">
@@ -3701,7 +3605,7 @@
         </p:nvSpPr>
         <p:spPr>
           <a:xfrm>
-            <a:off x="3842178" y="4046197"/>
+            <a:off x="4167003" y="3701117"/>
             <a:ext cx="1248936" cy="657922"/>
           </a:xfrm>
           <a:prstGeom prst="roundRect">
@@ -3760,7 +3664,7 @@
         </p:nvSpPr>
         <p:spPr>
           <a:xfrm>
-            <a:off x="5664443" y="4050942"/>
+            <a:off x="5996951" y="3693137"/>
             <a:ext cx="1248936" cy="657922"/>
           </a:xfrm>
           <a:prstGeom prst="roundRect">
@@ -3805,55 +3709,6 @@
           </a:p>
         </p:txBody>
       </p:sp>
-      <p:cxnSp>
-        <p:nvCxnSpPr>
-          <p:cNvPr id="125" name="Curved Connector 124">
-            <a:extLst>
-              <a:ext uri="{FF2B5EF4-FFF2-40B4-BE49-F238E27FC236}">
-                <a16:creationId xmlns:a16="http://schemas.microsoft.com/office/drawing/2014/main" id="{5AE6A4B3-CCF8-824C-81B2-0CFE66791CAA}"/>
-              </a:ext>
-            </a:extLst>
-          </p:cNvPr>
-          <p:cNvCxnSpPr>
-            <a:cxnSpLocks/>
-            <a:stCxn id="20" idx="0"/>
-          </p:cNvCxnSpPr>
-          <p:nvPr/>
-        </p:nvCxnSpPr>
-        <p:spPr>
-          <a:xfrm rot="16200000" flipH="1" flipV="1">
-            <a:off x="5891422" y="3818155"/>
-            <a:ext cx="164703" cy="630275"/>
-          </a:xfrm>
-          <a:prstGeom prst="curvedConnector4">
-            <a:avLst>
-              <a:gd name="adj1" fmla="val -238525"/>
-              <a:gd name="adj2" fmla="val 136270"/>
-            </a:avLst>
-          </a:prstGeom>
-          <a:ln>
-            <a:solidFill>
-              <a:schemeClr val="tx1"/>
-            </a:solidFill>
-            <a:headEnd type="none" w="med" len="med"/>
-            <a:tailEnd type="arrow" w="med" len="med"/>
-          </a:ln>
-        </p:spPr>
-        <p:style>
-          <a:lnRef idx="1">
-            <a:schemeClr val="accent1"/>
-          </a:lnRef>
-          <a:fillRef idx="0">
-            <a:schemeClr val="accent1"/>
-          </a:fillRef>
-          <a:effectRef idx="0">
-            <a:schemeClr val="accent1"/>
-          </a:effectRef>
-          <a:fontRef idx="minor">
-            <a:schemeClr val="tx1"/>
-          </a:fontRef>
-        </p:style>
-      </p:cxnSp>
       <p:sp>
         <p:nvSpPr>
           <p:cNvPr id="176" name="Rounded Rectangle 175">
@@ -3868,7 +3723,7 @@
         </p:nvSpPr>
         <p:spPr>
           <a:xfrm>
-            <a:off x="10889088" y="4058922"/>
+            <a:off x="9359852" y="4566290"/>
             <a:ext cx="1248936" cy="657922"/>
           </a:xfrm>
           <a:prstGeom prst="roundRect">
@@ -3924,15 +3779,15 @@
           </p:cNvPr>
           <p:cNvCxnSpPr>
             <a:cxnSpLocks/>
-            <a:stCxn id="38" idx="0"/>
-            <a:endCxn id="56" idx="2"/>
+            <a:stCxn id="127" idx="1"/>
+            <a:endCxn id="56" idx="3"/>
           </p:cNvCxnSpPr>
           <p:nvPr/>
         </p:nvCxnSpPr>
         <p:spPr>
-          <a:xfrm flipV="1">
-            <a:off x="9020019" y="4712169"/>
-            <a:ext cx="446137" cy="395481"/>
+          <a:xfrm flipH="1">
+            <a:off x="5415275" y="5337942"/>
+            <a:ext cx="585388" cy="0"/>
           </a:xfrm>
           <a:prstGeom prst="straightConnector1">
             <a:avLst/>
@@ -3974,7 +3829,7 @@
         </p:nvSpPr>
         <p:spPr>
           <a:xfrm>
-            <a:off x="10889088" y="5107650"/>
+            <a:off x="6897995" y="6158206"/>
             <a:ext cx="1248936" cy="657922"/>
           </a:xfrm>
           <a:prstGeom prst="roundRect">
@@ -4021,24 +3876,22 @@
       </p:sp>
       <p:cxnSp>
         <p:nvCxnSpPr>
-          <p:cNvPr id="187" name="Straight Arrow Connector 186">
-            <a:extLst>
-              <a:ext uri="{FF2B5EF4-FFF2-40B4-BE49-F238E27FC236}">
-                <a16:creationId xmlns:a16="http://schemas.microsoft.com/office/drawing/2014/main" id="{866DF522-99E0-B74E-BC74-ECD617C4C124}"/>
+          <p:cNvPr id="193" name="Straight Arrow Connector 192">
+            <a:extLst>
+              <a:ext uri="{FF2B5EF4-FFF2-40B4-BE49-F238E27FC236}">
+                <a16:creationId xmlns:a16="http://schemas.microsoft.com/office/drawing/2014/main" id="{43EC0CBA-80CC-1E42-91DC-5E646B8E728C}"/>
               </a:ext>
             </a:extLst>
           </p:cNvPr>
           <p:cNvCxnSpPr>
             <a:cxnSpLocks/>
-            <a:stCxn id="183" idx="0"/>
-            <a:endCxn id="176" idx="2"/>
           </p:cNvCxnSpPr>
           <p:nvPr/>
         </p:nvCxnSpPr>
         <p:spPr>
           <a:xfrm flipV="1">
-            <a:off x="11513556" y="4716844"/>
-            <a:ext cx="0" cy="390806"/>
+            <a:off x="2692886" y="3591965"/>
+            <a:ext cx="0" cy="423747"/>
           </a:xfrm>
           <a:prstGeom prst="straightConnector1">
             <a:avLst/>
@@ -4067,52 +3920,6 @@
           </a:fontRef>
         </p:style>
       </p:cxnSp>
-      <p:cxnSp>
-        <p:nvCxnSpPr>
-          <p:cNvPr id="193" name="Straight Arrow Connector 192">
-            <a:extLst>
-              <a:ext uri="{FF2B5EF4-FFF2-40B4-BE49-F238E27FC236}">
-                <a16:creationId xmlns:a16="http://schemas.microsoft.com/office/drawing/2014/main" id="{43EC0CBA-80CC-1E42-91DC-5E646B8E728C}"/>
-              </a:ext>
-            </a:extLst>
-          </p:cNvPr>
-          <p:cNvCxnSpPr>
-            <a:cxnSpLocks/>
-          </p:cNvCxnSpPr>
-          <p:nvPr/>
-        </p:nvCxnSpPr>
-        <p:spPr>
-          <a:xfrm flipV="1">
-            <a:off x="1351752" y="4873840"/>
-            <a:ext cx="0" cy="423747"/>
-          </a:xfrm>
-          <a:prstGeom prst="straightConnector1">
-            <a:avLst/>
-          </a:prstGeom>
-          <a:ln>
-            <a:solidFill>
-              <a:schemeClr val="tx1"/>
-            </a:solidFill>
-            <a:prstDash val="dash"/>
-            <a:headEnd type="none" w="med" len="med"/>
-            <a:tailEnd type="arrow" w="med" len="med"/>
-          </a:ln>
-        </p:spPr>
-        <p:style>
-          <a:lnRef idx="1">
-            <a:schemeClr val="accent1"/>
-          </a:lnRef>
-          <a:fillRef idx="0">
-            <a:schemeClr val="accent1"/>
-          </a:fillRef>
-          <a:effectRef idx="0">
-            <a:schemeClr val="accent1"/>
-          </a:effectRef>
-          <a:fontRef idx="minor">
-            <a:schemeClr val="tx1"/>
-          </a:fontRef>
-        </p:style>
-      </p:cxnSp>
       <p:sp>
         <p:nvSpPr>
           <p:cNvPr id="194" name="TextBox 193">
@@ -4127,7 +3934,7 @@
         </p:nvSpPr>
         <p:spPr>
           <a:xfrm>
-            <a:off x="1394035" y="4947213"/>
+            <a:off x="2735169" y="3665338"/>
             <a:ext cx="1145506" cy="276999"/>
           </a:xfrm>
           <a:prstGeom prst="rect">
@@ -4164,7 +3971,7 @@
         </p:nvSpPr>
         <p:spPr>
           <a:xfrm>
-            <a:off x="1301930" y="4023759"/>
+            <a:off x="2643064" y="2741884"/>
             <a:ext cx="1248936" cy="657922"/>
           </a:xfrm>
           <a:prstGeom prst="roundRect">
@@ -4225,7 +4032,7 @@
         </p:nvCxnSpPr>
         <p:spPr>
           <a:xfrm flipV="1">
-            <a:off x="2692455" y="4873839"/>
+            <a:off x="2669719" y="4185097"/>
             <a:ext cx="0" cy="423748"/>
           </a:xfrm>
           <a:prstGeom prst="straightConnector1">
@@ -4269,7 +4076,7 @@
         </p:nvSpPr>
         <p:spPr>
           <a:xfrm>
-            <a:off x="2728620" y="4947213"/>
+            <a:off x="2705884" y="4258471"/>
             <a:ext cx="727187" cy="276999"/>
           </a:xfrm>
           <a:prstGeom prst="rect">
@@ -4306,7 +4113,7 @@
         </p:nvSpPr>
         <p:spPr>
           <a:xfrm>
-            <a:off x="7244619" y="3247755"/>
+            <a:off x="6004634" y="2307468"/>
             <a:ext cx="1248936" cy="657922"/>
           </a:xfrm>
           <a:prstGeom prst="roundRect">
@@ -4362,15 +4169,15 @@
           </p:cNvPr>
           <p:cNvCxnSpPr>
             <a:cxnSpLocks/>
-            <a:stCxn id="20" idx="3"/>
+            <a:stCxn id="20" idx="0"/>
             <a:endCxn id="39" idx="2"/>
           </p:cNvCxnSpPr>
           <p:nvPr/>
         </p:nvCxnSpPr>
         <p:spPr>
           <a:xfrm flipV="1">
-            <a:off x="6913379" y="3905677"/>
-            <a:ext cx="955708" cy="474226"/>
+            <a:off x="6621419" y="2965390"/>
+            <a:ext cx="7683" cy="727747"/>
           </a:xfrm>
           <a:prstGeom prst="straightConnector1">
             <a:avLst/>
@@ -4401,10 +4208,215 @@
       </p:cxnSp>
       <p:sp>
         <p:nvSpPr>
-          <p:cNvPr id="38" name="Rounded Rectangle 37">
-            <a:extLst>
-              <a:ext uri="{FF2B5EF4-FFF2-40B4-BE49-F238E27FC236}">
-                <a16:creationId xmlns:a16="http://schemas.microsoft.com/office/drawing/2014/main" id="{CCC82891-D0BF-D146-AEBF-E5C054C9F416}"/>
+          <p:cNvPr id="48" name="TextBox 47">
+            <a:extLst>
+              <a:ext uri="{FF2B5EF4-FFF2-40B4-BE49-F238E27FC236}">
+                <a16:creationId xmlns:a16="http://schemas.microsoft.com/office/drawing/2014/main" id="{BB232CB9-2245-A443-8CFB-F5E91477C0A1}"/>
+              </a:ext>
+            </a:extLst>
+          </p:cNvPr>
+          <p:cNvSpPr txBox="1"/>
+          <p:nvPr/>
+        </p:nvSpPr>
+        <p:spPr>
+          <a:xfrm>
+            <a:off x="2597599" y="2311283"/>
+            <a:ext cx="1090683" cy="307777"/>
+          </a:xfrm>
+          <a:prstGeom prst="rect">
+            <a:avLst/>
+          </a:prstGeom>
+          <a:noFill/>
+        </p:spPr>
+        <p:txBody>
+          <a:bodyPr wrap="none" rtlCol="0">
+            <a:spAutoFit/>
+          </a:bodyPr>
+          <a:lstStyle/>
+          <a:p>
+            <a:r>
+              <a:rPr lang="en-US" sz="1400" u="sng"/>
+              <a:t>Element Key</a:t>
+            </a:r>
+          </a:p>
+        </p:txBody>
+      </p:sp>
+      <p:cxnSp>
+        <p:nvCxnSpPr>
+          <p:cNvPr id="42" name="Curved Connector 41">
+            <a:extLst>
+              <a:ext uri="{FF2B5EF4-FFF2-40B4-BE49-F238E27FC236}">
+                <a16:creationId xmlns:a16="http://schemas.microsoft.com/office/drawing/2014/main" id="{1E704936-F7D0-9B4F-90F5-D6EE720D285B}"/>
+              </a:ext>
+            </a:extLst>
+          </p:cNvPr>
+          <p:cNvCxnSpPr>
+            <a:cxnSpLocks/>
+            <a:stCxn id="20" idx="0"/>
+            <a:endCxn id="176" idx="0"/>
+          </p:cNvCxnSpPr>
+          <p:nvPr/>
+        </p:nvCxnSpPr>
+        <p:spPr>
+          <a:xfrm rot="16200000" flipH="1">
+            <a:off x="7866292" y="2448263"/>
+            <a:ext cx="873153" cy="3362901"/>
+          </a:xfrm>
+          <a:prstGeom prst="curvedConnector3">
+            <a:avLst>
+              <a:gd name="adj1" fmla="val -26181"/>
+            </a:avLst>
+          </a:prstGeom>
+          <a:ln>
+            <a:solidFill>
+              <a:schemeClr val="tx1"/>
+            </a:solidFill>
+            <a:prstDash val="dash"/>
+            <a:headEnd type="none" w="med" len="med"/>
+            <a:tailEnd type="arrow" w="med" len="med"/>
+          </a:ln>
+        </p:spPr>
+        <p:style>
+          <a:lnRef idx="1">
+            <a:schemeClr val="accent1"/>
+          </a:lnRef>
+          <a:fillRef idx="0">
+            <a:schemeClr val="accent1"/>
+          </a:fillRef>
+          <a:effectRef idx="0">
+            <a:schemeClr val="accent1"/>
+          </a:effectRef>
+          <a:fontRef idx="minor">
+            <a:schemeClr val="tx1"/>
+          </a:fontRef>
+        </p:style>
+      </p:cxnSp>
+      <p:sp>
+        <p:nvSpPr>
+          <p:cNvPr id="74" name="TextBox 73">
+            <a:extLst>
+              <a:ext uri="{FF2B5EF4-FFF2-40B4-BE49-F238E27FC236}">
+                <a16:creationId xmlns:a16="http://schemas.microsoft.com/office/drawing/2014/main" id="{5F03DACD-EB7C-234F-9780-5157D2EAEC99}"/>
+              </a:ext>
+            </a:extLst>
+          </p:cNvPr>
+          <p:cNvSpPr txBox="1"/>
+          <p:nvPr/>
+        </p:nvSpPr>
+        <p:spPr>
+          <a:xfrm>
+            <a:off x="7381126" y="4173136"/>
+            <a:ext cx="354264" cy="184666"/>
+          </a:xfrm>
+          <a:prstGeom prst="rect">
+            <a:avLst/>
+          </a:prstGeom>
+          <a:solidFill>
+            <a:schemeClr val="bg1"/>
+          </a:solidFill>
+        </p:spPr>
+        <p:txBody>
+          <a:bodyPr wrap="none" lIns="0" tIns="0" rIns="0" bIns="0" rtlCol="0">
+            <a:spAutoFit/>
+          </a:bodyPr>
+          <a:lstStyle/>
+          <a:p>
+            <a:r>
+              <a:rPr lang="en-US" sz="1200" dirty="0"/>
+              <a:t>token</a:t>
+            </a:r>
+          </a:p>
+        </p:txBody>
+      </p:sp>
+      <p:sp>
+        <p:nvSpPr>
+          <p:cNvPr id="19" name="TextBox 18">
+            <a:extLst>
+              <a:ext uri="{FF2B5EF4-FFF2-40B4-BE49-F238E27FC236}">
+                <a16:creationId xmlns:a16="http://schemas.microsoft.com/office/drawing/2014/main" id="{A3F35545-D886-F341-9736-B188651A95C8}"/>
+              </a:ext>
+            </a:extLst>
+          </p:cNvPr>
+          <p:cNvSpPr txBox="1"/>
+          <p:nvPr/>
+        </p:nvSpPr>
+        <p:spPr>
+          <a:xfrm rot="16200000">
+            <a:off x="5365537" y="5267965"/>
+            <a:ext cx="684865" cy="184666"/>
+          </a:xfrm>
+          <a:prstGeom prst="rect">
+            <a:avLst/>
+          </a:prstGeom>
+          <a:solidFill>
+            <a:schemeClr val="bg1"/>
+          </a:solidFill>
+        </p:spPr>
+        <p:txBody>
+          <a:bodyPr wrap="square" lIns="0" tIns="0" rIns="0" bIns="0" rtlCol="0">
+            <a:spAutoFit/>
+          </a:bodyPr>
+          <a:lstStyle/>
+          <a:p>
+            <a:r>
+              <a:rPr lang="en-US" sz="1200" dirty="0" err="1"/>
+              <a:t>dct:format</a:t>
+            </a:r>
+            <a:endParaRPr lang="en-US" sz="1200" dirty="0"/>
+          </a:p>
+        </p:txBody>
+      </p:sp>
+      <p:cxnSp>
+        <p:nvCxnSpPr>
+          <p:cNvPr id="45" name="Straight Arrow Connector 44">
+            <a:extLst>
+              <a:ext uri="{FF2B5EF4-FFF2-40B4-BE49-F238E27FC236}">
+                <a16:creationId xmlns:a16="http://schemas.microsoft.com/office/drawing/2014/main" id="{C9368358-587A-6240-A313-AF5896B91669}"/>
+              </a:ext>
+            </a:extLst>
+          </p:cNvPr>
+          <p:cNvCxnSpPr>
+            <a:cxnSpLocks/>
+          </p:cNvCxnSpPr>
+          <p:nvPr/>
+        </p:nvCxnSpPr>
+        <p:spPr>
+          <a:xfrm>
+            <a:off x="6897995" y="5666903"/>
+            <a:ext cx="281426" cy="491303"/>
+          </a:xfrm>
+          <a:prstGeom prst="straightConnector1">
+            <a:avLst/>
+          </a:prstGeom>
+          <a:ln>
+            <a:solidFill>
+              <a:schemeClr val="tx1"/>
+            </a:solidFill>
+            <a:headEnd type="none" w="med" len="med"/>
+            <a:tailEnd type="arrow" w="med" len="med"/>
+          </a:ln>
+        </p:spPr>
+        <p:style>
+          <a:lnRef idx="1">
+            <a:schemeClr val="accent1"/>
+          </a:lnRef>
+          <a:fillRef idx="0">
+            <a:schemeClr val="accent1"/>
+          </a:fillRef>
+          <a:effectRef idx="0">
+            <a:schemeClr val="accent1"/>
+          </a:effectRef>
+          <a:fontRef idx="minor">
+            <a:schemeClr val="tx1"/>
+          </a:fontRef>
+        </p:style>
+      </p:cxnSp>
+      <p:sp>
+        <p:nvSpPr>
+          <p:cNvPr id="47" name="Rounded Rectangle 182">
+            <a:extLst>
+              <a:ext uri="{FF2B5EF4-FFF2-40B4-BE49-F238E27FC236}">
+                <a16:creationId xmlns:a16="http://schemas.microsoft.com/office/drawing/2014/main" id="{EFB09EAB-C7F2-4B65-A45F-482A5685C8DF}"/>
               </a:ext>
             </a:extLst>
           </p:cNvPr>
@@ -4413,7 +4425,563 @@
         </p:nvSpPr>
         <p:spPr>
           <a:xfrm>
-            <a:off x="8395551" y="5107650"/>
+            <a:off x="5058429" y="6158206"/>
+            <a:ext cx="1248936" cy="657922"/>
+          </a:xfrm>
+          <a:prstGeom prst="roundRect">
+            <a:avLst/>
+          </a:prstGeom>
+          <a:noFill/>
+          <a:ln>
+            <a:solidFill>
+              <a:schemeClr val="tx1"/>
+            </a:solidFill>
+          </a:ln>
+        </p:spPr>
+        <p:style>
+          <a:lnRef idx="2">
+            <a:schemeClr val="accent1">
+              <a:shade val="50000"/>
+            </a:schemeClr>
+          </a:lnRef>
+          <a:fillRef idx="1">
+            <a:schemeClr val="accent1"/>
+          </a:fillRef>
+          <a:effectRef idx="0">
+            <a:schemeClr val="accent1"/>
+          </a:effectRef>
+          <a:fontRef idx="minor">
+            <a:schemeClr val="lt1"/>
+          </a:fontRef>
+        </p:style>
+        <p:txBody>
+          <a:bodyPr rtlCol="0" anchor="ctr"/>
+          <a:lstStyle/>
+          <a:p>
+            <a:pPr algn="ctr"/>
+            <a:r>
+              <a:rPr lang="en-US" sz="1200" dirty="0">
+                <a:solidFill>
+                  <a:schemeClr val="tx1"/>
+                </a:solidFill>
+              </a:rPr>
+              <a:t>Resource</a:t>
+            </a:r>
+          </a:p>
+        </p:txBody>
+      </p:sp>
+      <p:cxnSp>
+        <p:nvCxnSpPr>
+          <p:cNvPr id="49" name="Straight Arrow Connector 48">
+            <a:extLst>
+              <a:ext uri="{FF2B5EF4-FFF2-40B4-BE49-F238E27FC236}">
+                <a16:creationId xmlns:a16="http://schemas.microsoft.com/office/drawing/2014/main" id="{BF1CFF90-8E3D-45BD-80A5-7EEBDB26996C}"/>
+              </a:ext>
+            </a:extLst>
+          </p:cNvPr>
+          <p:cNvCxnSpPr>
+            <a:cxnSpLocks/>
+          </p:cNvCxnSpPr>
+          <p:nvPr/>
+        </p:nvCxnSpPr>
+        <p:spPr>
+          <a:xfrm flipH="1">
+            <a:off x="5941640" y="5674470"/>
+            <a:ext cx="365725" cy="491302"/>
+          </a:xfrm>
+          <a:prstGeom prst="straightConnector1">
+            <a:avLst/>
+          </a:prstGeom>
+          <a:ln>
+            <a:solidFill>
+              <a:schemeClr val="tx1"/>
+            </a:solidFill>
+            <a:headEnd type="none" w="med" len="med"/>
+            <a:tailEnd type="arrow" w="med" len="med"/>
+          </a:ln>
+        </p:spPr>
+        <p:style>
+          <a:lnRef idx="1">
+            <a:schemeClr val="accent1"/>
+          </a:lnRef>
+          <a:fillRef idx="0">
+            <a:schemeClr val="accent1"/>
+          </a:fillRef>
+          <a:effectRef idx="0">
+            <a:schemeClr val="accent1"/>
+          </a:effectRef>
+          <a:fontRef idx="minor">
+            <a:schemeClr val="tx1"/>
+          </a:fontRef>
+        </p:style>
+      </p:cxnSp>
+      <p:sp>
+        <p:nvSpPr>
+          <p:cNvPr id="50" name="TextBox 49">
+            <a:extLst>
+              <a:ext uri="{FF2B5EF4-FFF2-40B4-BE49-F238E27FC236}">
+                <a16:creationId xmlns:a16="http://schemas.microsoft.com/office/drawing/2014/main" id="{22FD51B1-AE57-434C-A625-7B81DF44ED7D}"/>
+              </a:ext>
+            </a:extLst>
+          </p:cNvPr>
+          <p:cNvSpPr txBox="1"/>
+          <p:nvPr/>
+        </p:nvSpPr>
+        <p:spPr>
+          <a:xfrm>
+            <a:off x="5918430" y="5764822"/>
+            <a:ext cx="447430" cy="184666"/>
+          </a:xfrm>
+          <a:prstGeom prst="rect">
+            <a:avLst/>
+          </a:prstGeom>
+          <a:solidFill>
+            <a:schemeClr val="bg1"/>
+          </a:solidFill>
+        </p:spPr>
+        <p:txBody>
+          <a:bodyPr wrap="none" lIns="0" tIns="0" rIns="0" bIns="0" rtlCol="0">
+            <a:spAutoFit/>
+          </a:bodyPr>
+          <a:lstStyle/>
+          <a:p>
+            <a:r>
+              <a:rPr lang="en-US" sz="1200" dirty="0"/>
+              <a:t>artifact</a:t>
+            </a:r>
+          </a:p>
+        </p:txBody>
+      </p:sp>
+      <p:cxnSp>
+        <p:nvCxnSpPr>
+          <p:cNvPr id="51" name="Straight Arrow Connector 50">
+            <a:extLst>
+              <a:ext uri="{FF2B5EF4-FFF2-40B4-BE49-F238E27FC236}">
+                <a16:creationId xmlns:a16="http://schemas.microsoft.com/office/drawing/2014/main" id="{3FE75ACA-CB50-49F4-81EE-8CC3773D5A6E}"/>
+              </a:ext>
+            </a:extLst>
+          </p:cNvPr>
+          <p:cNvCxnSpPr>
+            <a:cxnSpLocks/>
+          </p:cNvCxnSpPr>
+          <p:nvPr/>
+        </p:nvCxnSpPr>
+        <p:spPr>
+          <a:xfrm>
+            <a:off x="7098500" y="4351059"/>
+            <a:ext cx="3712" cy="657922"/>
+          </a:xfrm>
+          <a:prstGeom prst="straightConnector1">
+            <a:avLst/>
+          </a:prstGeom>
+          <a:ln>
+            <a:solidFill>
+              <a:schemeClr val="tx1"/>
+            </a:solidFill>
+            <a:headEnd type="none" w="med" len="med"/>
+            <a:tailEnd type="arrow" w="med" len="med"/>
+          </a:ln>
+        </p:spPr>
+        <p:style>
+          <a:lnRef idx="1">
+            <a:schemeClr val="accent1"/>
+          </a:lnRef>
+          <a:fillRef idx="0">
+            <a:schemeClr val="accent1"/>
+          </a:fillRef>
+          <a:effectRef idx="0">
+            <a:schemeClr val="accent1"/>
+          </a:effectRef>
+          <a:fontRef idx="minor">
+            <a:schemeClr val="tx1"/>
+          </a:fontRef>
+        </p:style>
+      </p:cxnSp>
+      <p:sp>
+        <p:nvSpPr>
+          <p:cNvPr id="36" name="TextBox 35">
+            <a:extLst>
+              <a:ext uri="{FF2B5EF4-FFF2-40B4-BE49-F238E27FC236}">
+                <a16:creationId xmlns:a16="http://schemas.microsoft.com/office/drawing/2014/main" id="{2439A7AD-5BC1-1140-9CFD-EB5B337D12EB}"/>
+              </a:ext>
+            </a:extLst>
+          </p:cNvPr>
+          <p:cNvSpPr txBox="1"/>
+          <p:nvPr/>
+        </p:nvSpPr>
+        <p:spPr>
+          <a:xfrm>
+            <a:off x="6859357" y="4549555"/>
+            <a:ext cx="543931" cy="184666"/>
+          </a:xfrm>
+          <a:prstGeom prst="rect">
+            <a:avLst/>
+          </a:prstGeom>
+          <a:solidFill>
+            <a:schemeClr val="bg1"/>
+          </a:solidFill>
+        </p:spPr>
+        <p:txBody>
+          <a:bodyPr wrap="none" lIns="0" tIns="0" rIns="0" bIns="0" rtlCol="0">
+            <a:spAutoFit/>
+          </a:bodyPr>
+          <a:lstStyle/>
+          <a:p>
+            <a:r>
+              <a:rPr lang="en-US" sz="1200" dirty="0"/>
+              <a:t>resource</a:t>
+            </a:r>
+          </a:p>
+        </p:txBody>
+      </p:sp>
+      <p:cxnSp>
+        <p:nvCxnSpPr>
+          <p:cNvPr id="52" name="Straight Arrow Connector 51">
+            <a:extLst>
+              <a:ext uri="{FF2B5EF4-FFF2-40B4-BE49-F238E27FC236}">
+                <a16:creationId xmlns:a16="http://schemas.microsoft.com/office/drawing/2014/main" id="{0E677052-7D57-4F0F-907C-A1B6ADAB18B3}"/>
+              </a:ext>
+            </a:extLst>
+          </p:cNvPr>
+          <p:cNvCxnSpPr>
+            <a:cxnSpLocks/>
+          </p:cNvCxnSpPr>
+          <p:nvPr/>
+        </p:nvCxnSpPr>
+        <p:spPr>
+          <a:xfrm flipH="1" flipV="1">
+            <a:off x="6160238" y="4351059"/>
+            <a:ext cx="3712" cy="657922"/>
+          </a:xfrm>
+          <a:prstGeom prst="straightConnector1">
+            <a:avLst/>
+          </a:prstGeom>
+          <a:ln>
+            <a:solidFill>
+              <a:schemeClr val="tx1"/>
+            </a:solidFill>
+            <a:headEnd type="none" w="med" len="med"/>
+            <a:tailEnd type="arrow" w="med" len="med"/>
+          </a:ln>
+        </p:spPr>
+        <p:style>
+          <a:lnRef idx="1">
+            <a:schemeClr val="accent1"/>
+          </a:lnRef>
+          <a:fillRef idx="0">
+            <a:schemeClr val="accent1"/>
+          </a:fillRef>
+          <a:effectRef idx="0">
+            <a:schemeClr val="accent1"/>
+          </a:effectRef>
+          <a:fontRef idx="minor">
+            <a:schemeClr val="tx1"/>
+          </a:fontRef>
+        </p:style>
+      </p:cxnSp>
+      <p:sp>
+        <p:nvSpPr>
+          <p:cNvPr id="46" name="TextBox 45">
+            <a:extLst>
+              <a:ext uri="{FF2B5EF4-FFF2-40B4-BE49-F238E27FC236}">
+                <a16:creationId xmlns:a16="http://schemas.microsoft.com/office/drawing/2014/main" id="{5FB455BE-701D-4332-AAA3-96ADC53BBE2F}"/>
+              </a:ext>
+            </a:extLst>
+          </p:cNvPr>
+          <p:cNvSpPr txBox="1"/>
+          <p:nvPr/>
+        </p:nvSpPr>
+        <p:spPr>
+          <a:xfrm>
+            <a:off x="5847280" y="4548788"/>
+            <a:ext cx="904735" cy="184666"/>
+          </a:xfrm>
+          <a:prstGeom prst="rect">
+            <a:avLst/>
+          </a:prstGeom>
+          <a:solidFill>
+            <a:schemeClr val="bg1"/>
+          </a:solidFill>
+        </p:spPr>
+        <p:txBody>
+          <a:bodyPr wrap="none" lIns="0" tIns="0" rIns="0" bIns="0" rtlCol="0">
+            <a:spAutoFit/>
+          </a:bodyPr>
+          <a:lstStyle/>
+          <a:p>
+            <a:r>
+              <a:rPr lang="en-US" sz="1200" dirty="0" err="1"/>
+              <a:t>inherited from</a:t>
+            </a:r>
+            <a:endParaRPr lang="en-US" sz="1200" dirty="0"/>
+          </a:p>
+        </p:txBody>
+      </p:sp>
+      <p:cxnSp>
+        <p:nvCxnSpPr>
+          <p:cNvPr id="96" name="Straight Arrow Connector 95">
+            <a:extLst>
+              <a:ext uri="{FF2B5EF4-FFF2-40B4-BE49-F238E27FC236}">
+                <a16:creationId xmlns:a16="http://schemas.microsoft.com/office/drawing/2014/main" id="{884A7436-AC80-45CB-A23D-83072CF12B50}"/>
+              </a:ext>
+            </a:extLst>
+          </p:cNvPr>
+          <p:cNvCxnSpPr>
+            <a:cxnSpLocks/>
+          </p:cNvCxnSpPr>
+          <p:nvPr/>
+        </p:nvCxnSpPr>
+        <p:spPr>
+          <a:xfrm flipV="1">
+            <a:off x="6176146" y="2965390"/>
+            <a:ext cx="7683" cy="727747"/>
+          </a:xfrm>
+          <a:prstGeom prst="straightConnector1">
+            <a:avLst/>
+          </a:prstGeom>
+          <a:ln>
+            <a:solidFill>
+              <a:schemeClr val="tx1"/>
+            </a:solidFill>
+            <a:headEnd type="none" w="med" len="med"/>
+            <a:tailEnd type="arrow" w="med" len="med"/>
+          </a:ln>
+        </p:spPr>
+        <p:style>
+          <a:lnRef idx="1">
+            <a:schemeClr val="accent1"/>
+          </a:lnRef>
+          <a:fillRef idx="0">
+            <a:schemeClr val="accent1"/>
+          </a:fillRef>
+          <a:effectRef idx="0">
+            <a:schemeClr val="accent1"/>
+          </a:effectRef>
+          <a:fontRef idx="minor">
+            <a:schemeClr val="tx1"/>
+          </a:fontRef>
+        </p:style>
+      </p:cxnSp>
+      <p:cxnSp>
+        <p:nvCxnSpPr>
+          <p:cNvPr id="100" name="Straight Arrow Connector 99">
+            <a:extLst>
+              <a:ext uri="{FF2B5EF4-FFF2-40B4-BE49-F238E27FC236}">
+                <a16:creationId xmlns:a16="http://schemas.microsoft.com/office/drawing/2014/main" id="{DA53F672-02CC-43B1-AE10-7380345FB5F7}"/>
+              </a:ext>
+            </a:extLst>
+          </p:cNvPr>
+          <p:cNvCxnSpPr>
+            <a:cxnSpLocks/>
+          </p:cNvCxnSpPr>
+          <p:nvPr/>
+        </p:nvCxnSpPr>
+        <p:spPr>
+          <a:xfrm>
+            <a:off x="7057012" y="2965390"/>
+            <a:ext cx="0" cy="731053"/>
+          </a:xfrm>
+          <a:prstGeom prst="straightConnector1">
+            <a:avLst/>
+          </a:prstGeom>
+          <a:ln>
+            <a:solidFill>
+              <a:schemeClr val="tx1"/>
+            </a:solidFill>
+            <a:headEnd type="none" w="med" len="med"/>
+            <a:tailEnd type="arrow" w="med" len="med"/>
+          </a:ln>
+        </p:spPr>
+        <p:style>
+          <a:lnRef idx="1">
+            <a:schemeClr val="accent1"/>
+          </a:lnRef>
+          <a:fillRef idx="0">
+            <a:schemeClr val="accent1"/>
+          </a:fillRef>
+          <a:effectRef idx="0">
+            <a:schemeClr val="accent1"/>
+          </a:effectRef>
+          <a:fontRef idx="minor">
+            <a:schemeClr val="tx1"/>
+          </a:fontRef>
+        </p:style>
+      </p:cxnSp>
+      <p:sp>
+        <p:nvSpPr>
+          <p:cNvPr id="130" name="TextBox 129">
+            <a:extLst>
+              <a:ext uri="{FF2B5EF4-FFF2-40B4-BE49-F238E27FC236}">
+                <a16:creationId xmlns:a16="http://schemas.microsoft.com/office/drawing/2014/main" id="{F6CD0418-5FC8-F748-BE9F-2CCB98F779D9}"/>
+              </a:ext>
+            </a:extLst>
+          </p:cNvPr>
+          <p:cNvSpPr txBox="1"/>
+          <p:nvPr/>
+        </p:nvSpPr>
+        <p:spPr>
+          <a:xfrm>
+            <a:off x="5887867" y="3206117"/>
+            <a:ext cx="700062" cy="184666"/>
+          </a:xfrm>
+          <a:prstGeom prst="rect">
+            <a:avLst/>
+          </a:prstGeom>
+          <a:solidFill>
+            <a:schemeClr val="bg1"/>
+          </a:solidFill>
+        </p:spPr>
+        <p:txBody>
+          <a:bodyPr wrap="square" lIns="0" tIns="0" rIns="0" bIns="0" rtlCol="0">
+            <a:spAutoFit/>
+          </a:bodyPr>
+          <a:lstStyle/>
+          <a:p>
+            <a:r>
+              <a:rPr lang="en-US" sz="1200" dirty="0"/>
+              <a:t>profile of</a:t>
+            </a:r>
+          </a:p>
+        </p:txBody>
+      </p:sp>
+      <p:sp>
+        <p:nvSpPr>
+          <p:cNvPr id="54" name="TextBox 53">
+            <a:extLst>
+              <a:ext uri="{FF2B5EF4-FFF2-40B4-BE49-F238E27FC236}">
+                <a16:creationId xmlns:a16="http://schemas.microsoft.com/office/drawing/2014/main" id="{198406C3-88D1-4B81-811B-62CE1882DC84}"/>
+              </a:ext>
+            </a:extLst>
+          </p:cNvPr>
+          <p:cNvSpPr txBox="1"/>
+          <p:nvPr/>
+        </p:nvSpPr>
+        <p:spPr>
+          <a:xfrm>
+            <a:off x="6822401" y="3194722"/>
+            <a:ext cx="700062" cy="184666"/>
+          </a:xfrm>
+          <a:prstGeom prst="rect">
+            <a:avLst/>
+          </a:prstGeom>
+          <a:solidFill>
+            <a:schemeClr val="bg1"/>
+          </a:solidFill>
+        </p:spPr>
+        <p:txBody>
+          <a:bodyPr wrap="square" lIns="0" tIns="0" rIns="0" bIns="0" rtlCol="0">
+            <a:spAutoFit/>
+          </a:bodyPr>
+          <a:lstStyle/>
+          <a:p>
+            <a:r>
+              <a:rPr lang="en-US" sz="1200" dirty="0"/>
+              <a:t>has profile</a:t>
+            </a:r>
+          </a:p>
+        </p:txBody>
+      </p:sp>
+      <p:cxnSp>
+        <p:nvCxnSpPr>
+          <p:cNvPr id="123" name="Straight Arrow Connector 122">
+            <a:extLst>
+              <a:ext uri="{FF2B5EF4-FFF2-40B4-BE49-F238E27FC236}">
+                <a16:creationId xmlns:a16="http://schemas.microsoft.com/office/drawing/2014/main" id="{DE579B37-86D6-4507-AFC3-16747271BEBE}"/>
+              </a:ext>
+            </a:extLst>
+          </p:cNvPr>
+          <p:cNvCxnSpPr>
+            <a:cxnSpLocks/>
+          </p:cNvCxnSpPr>
+          <p:nvPr/>
+        </p:nvCxnSpPr>
+        <p:spPr>
+          <a:xfrm flipV="1">
+            <a:off x="5415939" y="4173171"/>
+            <a:ext cx="581012" cy="7980"/>
+          </a:xfrm>
+          <a:prstGeom prst="straightConnector1">
+            <a:avLst/>
+          </a:prstGeom>
+          <a:ln>
+            <a:solidFill>
+              <a:schemeClr val="tx1"/>
+            </a:solidFill>
+            <a:headEnd type="none" w="med" len="med"/>
+            <a:tailEnd type="arrow" w="med" len="med"/>
+          </a:ln>
+        </p:spPr>
+        <p:style>
+          <a:lnRef idx="1">
+            <a:schemeClr val="accent1"/>
+          </a:lnRef>
+          <a:fillRef idx="0">
+            <a:schemeClr val="accent1"/>
+          </a:fillRef>
+          <a:effectRef idx="0">
+            <a:schemeClr val="accent1"/>
+          </a:effectRef>
+          <a:fontRef idx="minor">
+            <a:schemeClr val="tx1"/>
+          </a:fontRef>
+        </p:style>
+      </p:cxnSp>
+      <p:sp>
+        <p:nvSpPr>
+          <p:cNvPr id="37" name="TextBox 36">
+            <a:extLst>
+              <a:ext uri="{FF2B5EF4-FFF2-40B4-BE49-F238E27FC236}">
+                <a16:creationId xmlns:a16="http://schemas.microsoft.com/office/drawing/2014/main" id="{D112D62A-46A2-8F4F-98B1-7631B1975349}"/>
+              </a:ext>
+            </a:extLst>
+          </p:cNvPr>
+          <p:cNvSpPr txBox="1"/>
+          <p:nvPr/>
+        </p:nvSpPr>
+        <p:spPr>
+          <a:xfrm rot="5400000">
+            <a:off x="5312499" y="4214954"/>
+            <a:ext cx="776559" cy="184666"/>
+          </a:xfrm>
+          <a:prstGeom prst="rect">
+            <a:avLst/>
+          </a:prstGeom>
+          <a:solidFill>
+            <a:schemeClr val="bg1"/>
+          </a:solidFill>
+        </p:spPr>
+        <p:txBody>
+          <a:bodyPr wrap="none" lIns="0" tIns="0" rIns="0" bIns="0" rtlCol="0">
+            <a:spAutoFit/>
+          </a:bodyPr>
+          <a:lstStyle/>
+          <a:p>
+            <a:r>
+              <a:rPr lang="en-US" sz="1200" dirty="0" err="1"/>
+              <a:t>profile of</a:t>
+            </a:r>
+            <a:r>
+              <a:rPr lang="en-US" sz="1200" dirty="0"/>
+              <a:t> [0]</a:t>
+            </a:r>
+          </a:p>
+        </p:txBody>
+      </p:sp>
+      <p:sp>
+        <p:nvSpPr>
+          <p:cNvPr id="127" name="Rounded Rectangle 37">
+            <a:extLst>
+              <a:ext uri="{FF2B5EF4-FFF2-40B4-BE49-F238E27FC236}">
+                <a16:creationId xmlns:a16="http://schemas.microsoft.com/office/drawing/2014/main" id="{F90EB35C-B0B3-44BD-B112-A74244000305}"/>
+              </a:ext>
+            </a:extLst>
+          </p:cNvPr>
+          <p:cNvSpPr/>
+          <p:nvPr/>
+        </p:nvSpPr>
+        <p:spPr>
+          <a:xfrm>
+            <a:off x="6000663" y="5008981"/>
             <a:ext cx="1248936" cy="657922"/>
           </a:xfrm>
           <a:prstGeom prst="roundRect">
@@ -4460,10 +5028,10 @@
       </p:sp>
       <p:sp>
         <p:nvSpPr>
-          <p:cNvPr id="48" name="TextBox 47">
-            <a:extLst>
-              <a:ext uri="{FF2B5EF4-FFF2-40B4-BE49-F238E27FC236}">
-                <a16:creationId xmlns:a16="http://schemas.microsoft.com/office/drawing/2014/main" id="{BB232CB9-2245-A443-8CFB-F5E91477C0A1}"/>
+          <p:cNvPr id="140" name="TextBox 139">
+            <a:extLst>
+              <a:ext uri="{FF2B5EF4-FFF2-40B4-BE49-F238E27FC236}">
+                <a16:creationId xmlns:a16="http://schemas.microsoft.com/office/drawing/2014/main" id="{C8D1DF39-1926-4FAB-80B7-C884FF683904}"/>
               </a:ext>
             </a:extLst>
           </p:cNvPr>
@@ -4472,51 +5040,177 @@
         </p:nvSpPr>
         <p:spPr>
           <a:xfrm>
-            <a:off x="1256465" y="3593158"/>
-            <a:ext cx="1090683" cy="307777"/>
+            <a:off x="7948052" y="4541842"/>
+            <a:ext cx="105798" cy="184666"/>
           </a:xfrm>
           <a:prstGeom prst="rect">
             <a:avLst/>
           </a:prstGeom>
-          <a:noFill/>
-        </p:spPr>
-        <p:txBody>
-          <a:bodyPr wrap="none" rtlCol="0">
+          <a:solidFill>
+            <a:schemeClr val="bg1"/>
+          </a:solidFill>
+        </p:spPr>
+        <p:txBody>
+          <a:bodyPr wrap="none" lIns="0" tIns="0" rIns="0" bIns="0" rtlCol="0">
             <a:spAutoFit/>
           </a:bodyPr>
           <a:lstStyle/>
           <a:p>
             <a:r>
-              <a:rPr lang="en-US" sz="1400" u="sng"/>
-              <a:t>Element Key</a:t>
+              <a:rPr lang="en-US" sz="1200" dirty="0"/>
+              <a:t>   </a:t>
+            </a:r>
+          </a:p>
+        </p:txBody>
+      </p:sp>
+      <p:sp>
+        <p:nvSpPr>
+          <p:cNvPr id="141" name="TextBox 140">
+            <a:extLst>
+              <a:ext uri="{FF2B5EF4-FFF2-40B4-BE49-F238E27FC236}">
+                <a16:creationId xmlns:a16="http://schemas.microsoft.com/office/drawing/2014/main" id="{59723E48-E319-4C92-B62B-DC69090F96B1}"/>
+              </a:ext>
+            </a:extLst>
+          </p:cNvPr>
+          <p:cNvSpPr txBox="1"/>
+          <p:nvPr/>
+        </p:nvSpPr>
+        <p:spPr>
+          <a:xfrm>
+            <a:off x="7987782" y="3385228"/>
+            <a:ext cx="105798" cy="184666"/>
+          </a:xfrm>
+          <a:prstGeom prst="rect">
+            <a:avLst/>
+          </a:prstGeom>
+          <a:solidFill>
+            <a:schemeClr val="bg1"/>
+          </a:solidFill>
+        </p:spPr>
+        <p:txBody>
+          <a:bodyPr wrap="none" lIns="0" tIns="0" rIns="0" bIns="0" rtlCol="0">
+            <a:spAutoFit/>
+          </a:bodyPr>
+          <a:lstStyle/>
+          <a:p>
+            <a:r>
+              <a:rPr lang="en-US" sz="1200" dirty="0"/>
+              <a:t>   </a:t>
             </a:r>
           </a:p>
         </p:txBody>
       </p:sp>
       <p:cxnSp>
         <p:nvCxnSpPr>
-          <p:cNvPr id="42" name="Curved Connector 41">
-            <a:extLst>
-              <a:ext uri="{FF2B5EF4-FFF2-40B4-BE49-F238E27FC236}">
-                <a16:creationId xmlns:a16="http://schemas.microsoft.com/office/drawing/2014/main" id="{1E704936-F7D0-9B4F-90F5-D6EE720D285B}"/>
+          <p:cNvPr id="132" name="Curved Connector 41">
+            <a:extLst>
+              <a:ext uri="{FF2B5EF4-FFF2-40B4-BE49-F238E27FC236}">
+                <a16:creationId xmlns:a16="http://schemas.microsoft.com/office/drawing/2014/main" id="{A57AADFA-5F18-4079-A4C1-C35BD6CE98D5}"/>
               </a:ext>
             </a:extLst>
           </p:cNvPr>
           <p:cNvCxnSpPr>
             <a:cxnSpLocks/>
-            <a:endCxn id="176" idx="0"/>
+            <a:stCxn id="127" idx="3"/>
+            <a:endCxn id="39" idx="3"/>
           </p:cNvCxnSpPr>
           <p:nvPr/>
         </p:nvCxnSpPr>
         <p:spPr>
-          <a:xfrm rot="16200000" flipH="1">
-            <a:off x="9029131" y="1574498"/>
-            <a:ext cx="12728" cy="4956121"/>
+          <a:xfrm flipV="1">
+            <a:off x="7249599" y="2636429"/>
+            <a:ext cx="3971" cy="2701513"/>
           </a:xfrm>
           <a:prstGeom prst="curvedConnector3">
             <a:avLst>
-              <a:gd name="adj1" fmla="val -10102742"/>
+              <a:gd name="adj1" fmla="val 22075699"/>
             </a:avLst>
+          </a:prstGeom>
+          <a:ln>
+            <a:solidFill>
+              <a:schemeClr val="tx1"/>
+            </a:solidFill>
+            <a:prstDash val="solid"/>
+            <a:headEnd type="none" w="med" len="med"/>
+            <a:tailEnd type="arrow" w="med" len="med"/>
+          </a:ln>
+        </p:spPr>
+        <p:style>
+          <a:lnRef idx="1">
+            <a:schemeClr val="accent1"/>
+          </a:lnRef>
+          <a:fillRef idx="0">
+            <a:schemeClr val="accent1"/>
+          </a:fillRef>
+          <a:effectRef idx="0">
+            <a:schemeClr val="accent1"/>
+          </a:effectRef>
+          <a:fontRef idx="minor">
+            <a:schemeClr val="tx1"/>
+          </a:fontRef>
+        </p:style>
+      </p:cxnSp>
+      <p:sp>
+        <p:nvSpPr>
+          <p:cNvPr id="59" name="TextBox 58">
+            <a:extLst>
+              <a:ext uri="{FF2B5EF4-FFF2-40B4-BE49-F238E27FC236}">
+                <a16:creationId xmlns:a16="http://schemas.microsoft.com/office/drawing/2014/main" id="{74C07DF3-497E-4D4B-86D9-69DC39DA8D13}"/>
+              </a:ext>
+            </a:extLst>
+          </p:cNvPr>
+          <p:cNvSpPr txBox="1"/>
+          <p:nvPr/>
+        </p:nvSpPr>
+        <p:spPr>
+          <a:xfrm>
+            <a:off x="7698594" y="3795236"/>
+            <a:ext cx="970009" cy="184666"/>
+          </a:xfrm>
+          <a:prstGeom prst="rect">
+            <a:avLst/>
+          </a:prstGeom>
+          <a:solidFill>
+            <a:schemeClr val="bg1"/>
+          </a:solidFill>
+        </p:spPr>
+        <p:txBody>
+          <a:bodyPr wrap="none" lIns="0" tIns="0" rIns="0" bIns="0" rtlCol="0">
+            <a:spAutoFit/>
+          </a:bodyPr>
+          <a:lstStyle/>
+          <a:p>
+            <a:r>
+              <a:rPr lang="en-US" sz="1200" dirty="0" err="1"/>
+              <a:t>dct:conformsTo</a:t>
+            </a:r>
+            <a:endParaRPr lang="en-US" sz="1200" dirty="0"/>
+          </a:p>
+        </p:txBody>
+      </p:sp>
+      <p:cxnSp>
+        <p:nvCxnSpPr>
+          <p:cNvPr id="153" name="Curved Connector 41">
+            <a:extLst>
+              <a:ext uri="{FF2B5EF4-FFF2-40B4-BE49-F238E27FC236}">
+                <a16:creationId xmlns:a16="http://schemas.microsoft.com/office/drawing/2014/main" id="{B4B04BAE-E18C-4334-A9BF-0209B4991225}"/>
+              </a:ext>
+            </a:extLst>
+          </p:cNvPr>
+          <p:cNvCxnSpPr>
+            <a:cxnSpLocks/>
+            <a:stCxn id="183" idx="3"/>
+            <a:endCxn id="176" idx="2"/>
+          </p:cNvCxnSpPr>
+          <p:nvPr/>
+        </p:nvCxnSpPr>
+        <p:spPr>
+          <a:xfrm flipV="1">
+            <a:off x="8146931" y="5224212"/>
+            <a:ext cx="1837389" cy="1262955"/>
+          </a:xfrm>
+          <a:prstGeom prst="curvedConnector2">
+            <a:avLst/>
           </a:prstGeom>
           <a:ln>
             <a:solidFill>
@@ -4544,10 +5238,10 @@
       </p:cxnSp>
       <p:sp>
         <p:nvSpPr>
-          <p:cNvPr id="59" name="TextBox 58">
-            <a:extLst>
-              <a:ext uri="{FF2B5EF4-FFF2-40B4-BE49-F238E27FC236}">
-                <a16:creationId xmlns:a16="http://schemas.microsoft.com/office/drawing/2014/main" id="{74C07DF3-497E-4D4B-86D9-69DC39DA8D13}"/>
+          <p:cNvPr id="168" name="TextBox 167">
+            <a:extLst>
+              <a:ext uri="{FF2B5EF4-FFF2-40B4-BE49-F238E27FC236}">
+                <a16:creationId xmlns:a16="http://schemas.microsoft.com/office/drawing/2014/main" id="{25AEB04E-5F14-1F41-A811-15E49E60030E}"/>
               </a:ext>
             </a:extLst>
           </p:cNvPr>
@@ -4556,8 +5250,8 @@
         </p:nvSpPr>
         <p:spPr>
           <a:xfrm>
-            <a:off x="7698594" y="4153041"/>
-            <a:ext cx="970009" cy="184666"/>
+            <a:off x="6645232" y="5764822"/>
+            <a:ext cx="823559" cy="184666"/>
           </a:xfrm>
           <a:prstGeom prst="rect">
             <a:avLst/>
@@ -4574,564 +5268,7 @@
           <a:p>
             <a:r>
               <a:rPr lang="en-US" sz="1200" dirty="0" err="1"/>
-              <a:t>dct:conformsTo</a:t>
-            </a:r>
-            <a:endParaRPr lang="en-US" sz="1200" dirty="0"/>
-          </a:p>
-        </p:txBody>
-      </p:sp>
-      <p:sp>
-        <p:nvSpPr>
-          <p:cNvPr id="37" name="TextBox 36">
-            <a:extLst>
-              <a:ext uri="{FF2B5EF4-FFF2-40B4-BE49-F238E27FC236}">
-                <a16:creationId xmlns:a16="http://schemas.microsoft.com/office/drawing/2014/main" id="{D112D62A-46A2-8F4F-98B1-7631B1975349}"/>
-              </a:ext>
-            </a:extLst>
-          </p:cNvPr>
-          <p:cNvSpPr txBox="1"/>
-          <p:nvPr/>
-        </p:nvSpPr>
-        <p:spPr>
-          <a:xfrm>
-            <a:off x="4596969" y="4808724"/>
-            <a:ext cx="776559" cy="184666"/>
-          </a:xfrm>
-          <a:prstGeom prst="rect">
-            <a:avLst/>
-          </a:prstGeom>
-          <a:solidFill>
-            <a:schemeClr val="bg1"/>
-          </a:solidFill>
-        </p:spPr>
-        <p:txBody>
-          <a:bodyPr wrap="none" lIns="0" tIns="0" rIns="0" bIns="0" rtlCol="0">
-            <a:spAutoFit/>
-          </a:bodyPr>
-          <a:lstStyle/>
-          <a:p>
-            <a:r>
-              <a:rPr lang="en-US" sz="1200" dirty="0" err="1"/>
-              <a:t>profile of</a:t>
-            </a:r>
-            <a:r>
-              <a:rPr lang="en-US" sz="1200" dirty="0"/>
-              <a:t> [0]</a:t>
-            </a:r>
-          </a:p>
-        </p:txBody>
-      </p:sp>
-      <p:sp>
-        <p:nvSpPr>
-          <p:cNvPr id="74" name="TextBox 73">
-            <a:extLst>
-              <a:ext uri="{FF2B5EF4-FFF2-40B4-BE49-F238E27FC236}">
-                <a16:creationId xmlns:a16="http://schemas.microsoft.com/office/drawing/2014/main" id="{5F03DACD-EB7C-234F-9780-5157D2EAEC99}"/>
-              </a:ext>
-            </a:extLst>
-          </p:cNvPr>
-          <p:cNvSpPr txBox="1"/>
-          <p:nvPr/>
-        </p:nvSpPr>
-        <p:spPr>
-          <a:xfrm>
-            <a:off x="6418206" y="4808724"/>
-            <a:ext cx="354264" cy="184666"/>
-          </a:xfrm>
-          <a:prstGeom prst="rect">
-            <a:avLst/>
-          </a:prstGeom>
-          <a:solidFill>
-            <a:schemeClr val="bg1"/>
-          </a:solidFill>
-        </p:spPr>
-        <p:txBody>
-          <a:bodyPr wrap="none" lIns="0" tIns="0" rIns="0" bIns="0" rtlCol="0">
-            <a:spAutoFit/>
-          </a:bodyPr>
-          <a:lstStyle/>
-          <a:p>
-            <a:r>
-              <a:rPr lang="en-US" sz="1200" dirty="0"/>
-              <a:t>token</a:t>
-            </a:r>
-          </a:p>
-        </p:txBody>
-      </p:sp>
-      <p:sp>
-        <p:nvSpPr>
-          <p:cNvPr id="130" name="TextBox 129">
-            <a:extLst>
-              <a:ext uri="{FF2B5EF4-FFF2-40B4-BE49-F238E27FC236}">
-                <a16:creationId xmlns:a16="http://schemas.microsoft.com/office/drawing/2014/main" id="{F6CD0418-5FC8-F748-BE9F-2CCB98F779D9}"/>
-              </a:ext>
-            </a:extLst>
-          </p:cNvPr>
-          <p:cNvSpPr txBox="1"/>
-          <p:nvPr/>
-        </p:nvSpPr>
-        <p:spPr>
-          <a:xfrm>
-            <a:off x="4898113" y="3388275"/>
-            <a:ext cx="1539769" cy="184666"/>
-          </a:xfrm>
-          <a:prstGeom prst="rect">
-            <a:avLst/>
-          </a:prstGeom>
-          <a:solidFill>
-            <a:schemeClr val="bg1"/>
-          </a:solidFill>
-        </p:spPr>
-        <p:txBody>
-          <a:bodyPr wrap="square" lIns="0" tIns="0" rIns="0" bIns="0" rtlCol="0">
-            <a:spAutoFit/>
-          </a:bodyPr>
-          <a:lstStyle/>
-          <a:p>
-            <a:r>
-              <a:rPr lang="en-US" sz="1200" dirty="0" err="1"/>
-              <a:t>has profile</a:t>
-            </a:r>
-            <a:r>
-              <a:rPr lang="en-US" sz="1200" dirty="0"/>
-              <a:t> inv. p</a:t>
-            </a:r>
-            <a:r>
-              <a:rPr lang="en-US" sz="1200" dirty="0" err="1"/>
-              <a:t>rofile of</a:t>
-            </a:r>
-            <a:endParaRPr lang="en-US" sz="1200" dirty="0"/>
-          </a:p>
-        </p:txBody>
-      </p:sp>
-      <p:sp>
-        <p:nvSpPr>
-          <p:cNvPr id="168" name="TextBox 167">
-            <a:extLst>
-              <a:ext uri="{FF2B5EF4-FFF2-40B4-BE49-F238E27FC236}">
-                <a16:creationId xmlns:a16="http://schemas.microsoft.com/office/drawing/2014/main" id="{25AEB04E-5F14-1F41-A811-15E49E60030E}"/>
-              </a:ext>
-            </a:extLst>
-          </p:cNvPr>
-          <p:cNvSpPr txBox="1"/>
-          <p:nvPr/>
-        </p:nvSpPr>
-        <p:spPr>
-          <a:xfrm>
-            <a:off x="9862107" y="5216347"/>
-            <a:ext cx="823559" cy="184666"/>
-          </a:xfrm>
-          <a:prstGeom prst="rect">
-            <a:avLst/>
-          </a:prstGeom>
-          <a:solidFill>
-            <a:schemeClr val="bg1"/>
-          </a:solidFill>
-        </p:spPr>
-        <p:txBody>
-          <a:bodyPr wrap="none" lIns="0" tIns="0" rIns="0" bIns="0" rtlCol="0">
-            <a:spAutoFit/>
-          </a:bodyPr>
-          <a:lstStyle/>
-          <a:p>
-            <a:r>
-              <a:rPr lang="en-US" sz="1200" dirty="0" err="1"/>
               <a:t>resource role</a:t>
-            </a:r>
-            <a:endParaRPr lang="en-US" sz="1200" dirty="0"/>
-          </a:p>
-        </p:txBody>
-      </p:sp>
-      <p:sp>
-        <p:nvSpPr>
-          <p:cNvPr id="19" name="TextBox 18">
-            <a:extLst>
-              <a:ext uri="{FF2B5EF4-FFF2-40B4-BE49-F238E27FC236}">
-                <a16:creationId xmlns:a16="http://schemas.microsoft.com/office/drawing/2014/main" id="{A3F35545-D886-F341-9736-B188651A95C8}"/>
-              </a:ext>
-            </a:extLst>
-          </p:cNvPr>
-          <p:cNvSpPr txBox="1"/>
-          <p:nvPr/>
-        </p:nvSpPr>
-        <p:spPr>
-          <a:xfrm>
-            <a:off x="9068858" y="4833491"/>
-            <a:ext cx="684865" cy="184666"/>
-          </a:xfrm>
-          <a:prstGeom prst="rect">
-            <a:avLst/>
-          </a:prstGeom>
-          <a:solidFill>
-            <a:schemeClr val="bg1"/>
-          </a:solidFill>
-        </p:spPr>
-        <p:txBody>
-          <a:bodyPr wrap="square" lIns="0" tIns="0" rIns="0" bIns="0" rtlCol="0">
-            <a:spAutoFit/>
-          </a:bodyPr>
-          <a:lstStyle/>
-          <a:p>
-            <a:r>
-              <a:rPr lang="en-US" sz="1200" dirty="0" err="1"/>
-              <a:t>dct:format</a:t>
-            </a:r>
-            <a:endParaRPr lang="en-US" sz="1200" dirty="0"/>
-          </a:p>
-        </p:txBody>
-      </p:sp>
-      <p:cxnSp>
-        <p:nvCxnSpPr>
-          <p:cNvPr id="45" name="Straight Arrow Connector 44">
-            <a:extLst>
-              <a:ext uri="{FF2B5EF4-FFF2-40B4-BE49-F238E27FC236}">
-                <a16:creationId xmlns:a16="http://schemas.microsoft.com/office/drawing/2014/main" id="{C9368358-587A-6240-A313-AF5896B91669}"/>
-              </a:ext>
-            </a:extLst>
-          </p:cNvPr>
-          <p:cNvCxnSpPr>
-            <a:cxnSpLocks/>
-            <a:stCxn id="38" idx="3"/>
-            <a:endCxn id="183" idx="1"/>
-          </p:cNvCxnSpPr>
-          <p:nvPr/>
-        </p:nvCxnSpPr>
-        <p:spPr>
-          <a:xfrm>
-            <a:off x="9644487" y="5436611"/>
-            <a:ext cx="1244601" cy="0"/>
-          </a:xfrm>
-          <a:prstGeom prst="straightConnector1">
-            <a:avLst/>
-          </a:prstGeom>
-          <a:ln>
-            <a:solidFill>
-              <a:schemeClr val="tx1"/>
-            </a:solidFill>
-            <a:headEnd type="none" w="med" len="med"/>
-            <a:tailEnd type="arrow" w="med" len="med"/>
-          </a:ln>
-        </p:spPr>
-        <p:style>
-          <a:lnRef idx="1">
-            <a:schemeClr val="accent1"/>
-          </a:lnRef>
-          <a:fillRef idx="0">
-            <a:schemeClr val="accent1"/>
-          </a:fillRef>
-          <a:effectRef idx="0">
-            <a:schemeClr val="accent1"/>
-          </a:effectRef>
-          <a:fontRef idx="minor">
-            <a:schemeClr val="tx1"/>
-          </a:fontRef>
-        </p:style>
-      </p:cxnSp>
-      <p:sp>
-        <p:nvSpPr>
-          <p:cNvPr id="47" name="Rounded Rectangle 182">
-            <a:extLst>
-              <a:ext uri="{FF2B5EF4-FFF2-40B4-BE49-F238E27FC236}">
-                <a16:creationId xmlns:a16="http://schemas.microsoft.com/office/drawing/2014/main" id="{EFB09EAB-C7F2-4B65-A45F-482A5685C8DF}"/>
-              </a:ext>
-            </a:extLst>
-          </p:cNvPr>
-          <p:cNvSpPr/>
-          <p:nvPr/>
-        </p:nvSpPr>
-        <p:spPr>
-          <a:xfrm>
-            <a:off x="9753723" y="6145327"/>
-            <a:ext cx="1248936" cy="657922"/>
-          </a:xfrm>
-          <a:prstGeom prst="roundRect">
-            <a:avLst/>
-          </a:prstGeom>
-          <a:noFill/>
-          <a:ln>
-            <a:solidFill>
-              <a:schemeClr val="tx1"/>
-            </a:solidFill>
-          </a:ln>
-        </p:spPr>
-        <p:style>
-          <a:lnRef idx="2">
-            <a:schemeClr val="accent1">
-              <a:shade val="50000"/>
-            </a:schemeClr>
-          </a:lnRef>
-          <a:fillRef idx="1">
-            <a:schemeClr val="accent1"/>
-          </a:fillRef>
-          <a:effectRef idx="0">
-            <a:schemeClr val="accent1"/>
-          </a:effectRef>
-          <a:fontRef idx="minor">
-            <a:schemeClr val="lt1"/>
-          </a:fontRef>
-        </p:style>
-        <p:txBody>
-          <a:bodyPr rtlCol="0" anchor="ctr"/>
-          <a:lstStyle/>
-          <a:p>
-            <a:pPr algn="ctr"/>
-            <a:r>
-              <a:rPr lang="en-US" sz="1200" dirty="0">
-                <a:solidFill>
-                  <a:schemeClr val="tx1"/>
-                </a:solidFill>
-              </a:rPr>
-              <a:t>Resource</a:t>
-            </a:r>
-          </a:p>
-        </p:txBody>
-      </p:sp>
-      <p:cxnSp>
-        <p:nvCxnSpPr>
-          <p:cNvPr id="49" name="Straight Arrow Connector 48">
-            <a:extLst>
-              <a:ext uri="{FF2B5EF4-FFF2-40B4-BE49-F238E27FC236}">
-                <a16:creationId xmlns:a16="http://schemas.microsoft.com/office/drawing/2014/main" id="{BF1CFF90-8E3D-45BD-80A5-7EEBDB26996C}"/>
-              </a:ext>
-            </a:extLst>
-          </p:cNvPr>
-          <p:cNvCxnSpPr>
-            <a:cxnSpLocks/>
-            <a:stCxn id="38" idx="3"/>
-            <a:endCxn id="47" idx="0"/>
-          </p:cNvCxnSpPr>
-          <p:nvPr/>
-        </p:nvCxnSpPr>
-        <p:spPr>
-          <a:xfrm>
-            <a:off x="9644487" y="5436611"/>
-            <a:ext cx="733704" cy="708716"/>
-          </a:xfrm>
-          <a:prstGeom prst="straightConnector1">
-            <a:avLst/>
-          </a:prstGeom>
-          <a:ln>
-            <a:solidFill>
-              <a:schemeClr val="tx1"/>
-            </a:solidFill>
-            <a:headEnd type="none" w="med" len="med"/>
-            <a:tailEnd type="arrow" w="med" len="med"/>
-          </a:ln>
-        </p:spPr>
-        <p:style>
-          <a:lnRef idx="1">
-            <a:schemeClr val="accent1"/>
-          </a:lnRef>
-          <a:fillRef idx="0">
-            <a:schemeClr val="accent1"/>
-          </a:fillRef>
-          <a:effectRef idx="0">
-            <a:schemeClr val="accent1"/>
-          </a:effectRef>
-          <a:fontRef idx="minor">
-            <a:schemeClr val="tx1"/>
-          </a:fontRef>
-        </p:style>
-      </p:cxnSp>
-      <p:sp>
-        <p:nvSpPr>
-          <p:cNvPr id="50" name="TextBox 49">
-            <a:extLst>
-              <a:ext uri="{FF2B5EF4-FFF2-40B4-BE49-F238E27FC236}">
-                <a16:creationId xmlns:a16="http://schemas.microsoft.com/office/drawing/2014/main" id="{22FD51B1-AE57-434C-A625-7B81DF44ED7D}"/>
-              </a:ext>
-            </a:extLst>
-          </p:cNvPr>
-          <p:cNvSpPr txBox="1"/>
-          <p:nvPr/>
-        </p:nvSpPr>
-        <p:spPr>
-          <a:xfrm>
-            <a:off x="9738412" y="5650315"/>
-            <a:ext cx="486095" cy="184666"/>
-          </a:xfrm>
-          <a:prstGeom prst="rect">
-            <a:avLst/>
-          </a:prstGeom>
-          <a:solidFill>
-            <a:schemeClr val="bg1"/>
-          </a:solidFill>
-        </p:spPr>
-        <p:txBody>
-          <a:bodyPr wrap="none" lIns="0" tIns="0" rIns="0" bIns="0" rtlCol="0">
-            <a:spAutoFit/>
-          </a:bodyPr>
-          <a:lstStyle/>
-          <a:p>
-            <a:r>
-              <a:rPr lang="en-US" sz="1200" dirty="0"/>
-              <a:t>artefact</a:t>
-            </a:r>
-          </a:p>
-        </p:txBody>
-      </p:sp>
-      <p:cxnSp>
-        <p:nvCxnSpPr>
-          <p:cNvPr id="51" name="Straight Arrow Connector 50">
-            <a:extLst>
-              <a:ext uri="{FF2B5EF4-FFF2-40B4-BE49-F238E27FC236}">
-                <a16:creationId xmlns:a16="http://schemas.microsoft.com/office/drawing/2014/main" id="{3FE75ACA-CB50-49F4-81EE-8CC3773D5A6E}"/>
-              </a:ext>
-            </a:extLst>
-          </p:cNvPr>
-          <p:cNvCxnSpPr>
-            <a:cxnSpLocks/>
-            <a:stCxn id="20" idx="3"/>
-          </p:cNvCxnSpPr>
-          <p:nvPr/>
-        </p:nvCxnSpPr>
-        <p:spPr>
-          <a:xfrm>
-            <a:off x="6913379" y="4379903"/>
-            <a:ext cx="1495755" cy="769943"/>
-          </a:xfrm>
-          <a:prstGeom prst="straightConnector1">
-            <a:avLst/>
-          </a:prstGeom>
-          <a:ln>
-            <a:solidFill>
-              <a:schemeClr val="tx1"/>
-            </a:solidFill>
-            <a:headEnd type="none" w="med" len="med"/>
-            <a:tailEnd type="arrow" w="med" len="med"/>
-          </a:ln>
-        </p:spPr>
-        <p:style>
-          <a:lnRef idx="1">
-            <a:schemeClr val="accent1"/>
-          </a:lnRef>
-          <a:fillRef idx="0">
-            <a:schemeClr val="accent1"/>
-          </a:fillRef>
-          <a:effectRef idx="0">
-            <a:schemeClr val="accent1"/>
-          </a:effectRef>
-          <a:fontRef idx="minor">
-            <a:schemeClr val="tx1"/>
-          </a:fontRef>
-        </p:style>
-      </p:cxnSp>
-      <p:sp>
-        <p:nvSpPr>
-          <p:cNvPr id="36" name="TextBox 35">
-            <a:extLst>
-              <a:ext uri="{FF2B5EF4-FFF2-40B4-BE49-F238E27FC236}">
-                <a16:creationId xmlns:a16="http://schemas.microsoft.com/office/drawing/2014/main" id="{2439A7AD-5BC1-1140-9CFD-EB5B337D12EB}"/>
-              </a:ext>
-            </a:extLst>
-          </p:cNvPr>
-          <p:cNvSpPr txBox="1"/>
-          <p:nvPr/>
-        </p:nvSpPr>
-        <p:spPr>
-          <a:xfrm>
-            <a:off x="7425006" y="4683843"/>
-            <a:ext cx="543931" cy="184666"/>
-          </a:xfrm>
-          <a:prstGeom prst="rect">
-            <a:avLst/>
-          </a:prstGeom>
-          <a:solidFill>
-            <a:schemeClr val="bg1"/>
-          </a:solidFill>
-        </p:spPr>
-        <p:txBody>
-          <a:bodyPr wrap="none" lIns="0" tIns="0" rIns="0" bIns="0" rtlCol="0">
-            <a:spAutoFit/>
-          </a:bodyPr>
-          <a:lstStyle/>
-          <a:p>
-            <a:r>
-              <a:rPr lang="en-US" sz="1200" dirty="0"/>
-              <a:t>resource</a:t>
-            </a:r>
-          </a:p>
-        </p:txBody>
-      </p:sp>
-      <p:cxnSp>
-        <p:nvCxnSpPr>
-          <p:cNvPr id="52" name="Straight Arrow Connector 51">
-            <a:extLst>
-              <a:ext uri="{FF2B5EF4-FFF2-40B4-BE49-F238E27FC236}">
-                <a16:creationId xmlns:a16="http://schemas.microsoft.com/office/drawing/2014/main" id="{0E677052-7D57-4F0F-907C-A1B6ADAB18B3}"/>
-              </a:ext>
-            </a:extLst>
-          </p:cNvPr>
-          <p:cNvCxnSpPr>
-            <a:cxnSpLocks/>
-            <a:stCxn id="38" idx="1"/>
-          </p:cNvCxnSpPr>
-          <p:nvPr/>
-        </p:nvCxnSpPr>
-        <p:spPr>
-          <a:xfrm flipH="1" flipV="1">
-            <a:off x="6878670" y="4683843"/>
-            <a:ext cx="1516881" cy="752768"/>
-          </a:xfrm>
-          <a:prstGeom prst="straightConnector1">
-            <a:avLst/>
-          </a:prstGeom>
-          <a:ln>
-            <a:solidFill>
-              <a:schemeClr val="tx1"/>
-            </a:solidFill>
-            <a:headEnd type="none" w="med" len="med"/>
-            <a:tailEnd type="arrow" w="med" len="med"/>
-          </a:ln>
-        </p:spPr>
-        <p:style>
-          <a:lnRef idx="1">
-            <a:schemeClr val="accent1"/>
-          </a:lnRef>
-          <a:fillRef idx="0">
-            <a:schemeClr val="accent1"/>
-          </a:fillRef>
-          <a:effectRef idx="0">
-            <a:schemeClr val="accent1"/>
-          </a:effectRef>
-          <a:fontRef idx="minor">
-            <a:schemeClr val="tx1"/>
-          </a:fontRef>
-        </p:style>
-      </p:cxnSp>
-      <p:sp>
-        <p:nvSpPr>
-          <p:cNvPr id="46" name="TextBox 45">
-            <a:extLst>
-              <a:ext uri="{FF2B5EF4-FFF2-40B4-BE49-F238E27FC236}">
-                <a16:creationId xmlns:a16="http://schemas.microsoft.com/office/drawing/2014/main" id="{5FB455BE-701D-4332-AAA3-96ADC53BBE2F}"/>
-              </a:ext>
-            </a:extLst>
-          </p:cNvPr>
-          <p:cNvSpPr txBox="1"/>
-          <p:nvPr/>
-        </p:nvSpPr>
-        <p:spPr>
-          <a:xfrm>
-            <a:off x="7182232" y="5027508"/>
-            <a:ext cx="904735" cy="184666"/>
-          </a:xfrm>
-          <a:prstGeom prst="rect">
-            <a:avLst/>
-          </a:prstGeom>
-          <a:solidFill>
-            <a:schemeClr val="bg1"/>
-          </a:solidFill>
-        </p:spPr>
-        <p:txBody>
-          <a:bodyPr wrap="none" lIns="0" tIns="0" rIns="0" bIns="0" rtlCol="0">
-            <a:spAutoFit/>
-          </a:bodyPr>
-          <a:lstStyle/>
-          <a:p>
-            <a:r>
-              <a:rPr lang="en-US" sz="1200" dirty="0" err="1"/>
-              <a:t>inherited from</a:t>
             </a:r>
             <a:endParaRPr lang="en-US" sz="1200" dirty="0"/>
           </a:p>

</xml_diff>

<commit_message>
Corrected version wrt GeoDCAT-AP_IT
Slide 6 is the relevant one.
</commit_message>
<xml_diff>
--- a/profilesont/diagrams.pptx
+++ b/profilesont/diagrams.pptx
@@ -266,7 +266,7 @@
           <a:lstStyle/>
           <a:p>
             <a:fld id="{7E83BB5F-FC7B-E342-A7CB-8A5E9A913100}" type="datetimeFigureOut">
-              <a:t>11/5/2018</a:t>
+              <a:t>07/12/2018</a:t>
             </a:fld>
             <a:endParaRPr lang="en-US"/>
           </a:p>
@@ -462,7 +462,7 @@
           <a:lstStyle/>
           <a:p>
             <a:fld id="{7E83BB5F-FC7B-E342-A7CB-8A5E9A913100}" type="datetimeFigureOut">
-              <a:t>11/5/2018</a:t>
+              <a:t>07/12/2018</a:t>
             </a:fld>
             <a:endParaRPr lang="en-US"/>
           </a:p>
@@ -668,7 +668,7 @@
           <a:lstStyle/>
           <a:p>
             <a:fld id="{7E83BB5F-FC7B-E342-A7CB-8A5E9A913100}" type="datetimeFigureOut">
-              <a:t>11/5/2018</a:t>
+              <a:t>07/12/2018</a:t>
             </a:fld>
             <a:endParaRPr lang="en-US"/>
           </a:p>
@@ -864,7 +864,7 @@
           <a:lstStyle/>
           <a:p>
             <a:fld id="{7E83BB5F-FC7B-E342-A7CB-8A5E9A913100}" type="datetimeFigureOut">
-              <a:t>11/5/2018</a:t>
+              <a:t>07/12/2018</a:t>
             </a:fld>
             <a:endParaRPr lang="en-US"/>
           </a:p>
@@ -1137,7 +1137,7 @@
           <a:lstStyle/>
           <a:p>
             <a:fld id="{7E83BB5F-FC7B-E342-A7CB-8A5E9A913100}" type="datetimeFigureOut">
-              <a:t>11/5/2018</a:t>
+              <a:t>07/12/2018</a:t>
             </a:fld>
             <a:endParaRPr lang="en-US"/>
           </a:p>
@@ -1400,7 +1400,7 @@
           <a:lstStyle/>
           <a:p>
             <a:fld id="{7E83BB5F-FC7B-E342-A7CB-8A5E9A913100}" type="datetimeFigureOut">
-              <a:t>11/5/2018</a:t>
+              <a:t>07/12/2018</a:t>
             </a:fld>
             <a:endParaRPr lang="en-US"/>
           </a:p>
@@ -1810,7 +1810,7 @@
           <a:lstStyle/>
           <a:p>
             <a:fld id="{7E83BB5F-FC7B-E342-A7CB-8A5E9A913100}" type="datetimeFigureOut">
-              <a:t>11/5/2018</a:t>
+              <a:t>07/12/2018</a:t>
             </a:fld>
             <a:endParaRPr lang="en-US"/>
           </a:p>
@@ -1949,7 +1949,7 @@
           <a:lstStyle/>
           <a:p>
             <a:fld id="{7E83BB5F-FC7B-E342-A7CB-8A5E9A913100}" type="datetimeFigureOut">
-              <a:t>11/5/2018</a:t>
+              <a:t>07/12/2018</a:t>
             </a:fld>
             <a:endParaRPr lang="en-US"/>
           </a:p>
@@ -2060,7 +2060,7 @@
           <a:lstStyle/>
           <a:p>
             <a:fld id="{7E83BB5F-FC7B-E342-A7CB-8A5E9A913100}" type="datetimeFigureOut">
-              <a:t>11/5/2018</a:t>
+              <a:t>07/12/2018</a:t>
             </a:fld>
             <a:endParaRPr lang="en-US"/>
           </a:p>
@@ -2369,7 +2369,7 @@
           <a:lstStyle/>
           <a:p>
             <a:fld id="{7E83BB5F-FC7B-E342-A7CB-8A5E9A913100}" type="datetimeFigureOut">
-              <a:t>11/5/2018</a:t>
+              <a:t>07/12/2018</a:t>
             </a:fld>
             <a:endParaRPr lang="en-US"/>
           </a:p>
@@ -2655,7 +2655,7 @@
           <a:lstStyle/>
           <a:p>
             <a:fld id="{7E83BB5F-FC7B-E342-A7CB-8A5E9A913100}" type="datetimeFigureOut">
-              <a:t>11/5/2018</a:t>
+              <a:t>07/12/2018</a:t>
             </a:fld>
             <a:endParaRPr lang="en-US"/>
           </a:p>
@@ -2894,7 +2894,7 @@
           </a:lstStyle>
           <a:p>
             <a:fld id="{7E83BB5F-FC7B-E342-A7CB-8A5E9A913100}" type="datetimeFigureOut">
-              <a:t>11/5/2018</a:t>
+              <a:t>07/12/2018</a:t>
             </a:fld>
             <a:endParaRPr lang="en-US"/>
           </a:p>
@@ -17583,7 +17583,7 @@
           <a:p>
             <a:pPr algn="ctr"/>
             <a:r>
-              <a:rPr lang="en-US" sz="1400">
+              <a:rPr lang="en-US" sz="1400" dirty="0">
                 <a:solidFill>
                   <a:schemeClr val="tx1"/>
                 </a:solidFill>
@@ -17976,13 +17976,26 @@
           <a:p>
             <a:pPr algn="ctr"/>
             <a:r>
-              <a:rPr lang="en-US" sz="1400" dirty="0">
+              <a:rPr lang="en-US" sz="1400" dirty="0" err="1" smtClean="0">
                 <a:solidFill>
                   <a:schemeClr val="tx1"/>
                 </a:solidFill>
               </a:rPr>
-              <a:t>DCAT-AP-IT</a:t>
-            </a:r>
+              <a:t>GeoDCAT</a:t>
+            </a:r>
+            <a:r>
+              <a:rPr lang="en-US" sz="1400" dirty="0" smtClean="0">
+                <a:solidFill>
+                  <a:schemeClr val="tx1"/>
+                </a:solidFill>
+              </a:rPr>
+              <a:t>-AP_IT</a:t>
+            </a:r>
+            <a:endParaRPr lang="en-US" sz="1400" dirty="0">
+              <a:solidFill>
+                <a:schemeClr val="tx1"/>
+              </a:solidFill>
+            </a:endParaRPr>
           </a:p>
         </p:txBody>
       </p:sp>

</xml_diff>